<commit_message>
Update Probabilité et statistique.pptx
</commit_message>
<xml_diff>
--- a/Probabilité et statistique.pptx
+++ b/Probabilité et statistique.pptx
@@ -11,7 +11,6 @@
     <p:sldId id="259" r:id="rId8"/>
     <p:sldId id="260" r:id="rId9"/>
     <p:sldId id="261" r:id="rId10"/>
-    <p:sldId id="262" r:id="rId11"/>
   </p:sldIdLst>
   <p:sldSz cx="9144000" cy="6858000" type="screen4x3"/>
   <p:notesSz cx="6858000" cy="9144000"/>
@@ -309,7 +308,7 @@
             <a:fld id="{73302334-7E8B-4320-A1E2-4B05AC15A670}" type="datetimeFigureOut">
               <a:rPr lang="fr-FR" smtClean="0"/>
               <a:pPr/>
-              <a:t>07/10/2020</a:t>
+              <a:t>13/10/2020</a:t>
             </a:fld>
             <a:endParaRPr lang="fr-FR"/>
           </a:p>
@@ -474,7 +473,7 @@
             <a:fld id="{73302334-7E8B-4320-A1E2-4B05AC15A670}" type="datetimeFigureOut">
               <a:rPr lang="fr-FR" smtClean="0"/>
               <a:pPr/>
-              <a:t>07/10/2020</a:t>
+              <a:t>13/10/2020</a:t>
             </a:fld>
             <a:endParaRPr lang="fr-FR"/>
           </a:p>
@@ -649,7 +648,7 @@
             <a:fld id="{73302334-7E8B-4320-A1E2-4B05AC15A670}" type="datetimeFigureOut">
               <a:rPr lang="fr-FR" smtClean="0"/>
               <a:pPr/>
-              <a:t>07/10/2020</a:t>
+              <a:t>13/10/2020</a:t>
             </a:fld>
             <a:endParaRPr lang="fr-FR"/>
           </a:p>
@@ -814,7 +813,7 @@
             <a:fld id="{73302334-7E8B-4320-A1E2-4B05AC15A670}" type="datetimeFigureOut">
               <a:rPr lang="fr-FR" smtClean="0"/>
               <a:pPr/>
-              <a:t>07/10/2020</a:t>
+              <a:t>13/10/2020</a:t>
             </a:fld>
             <a:endParaRPr lang="fr-FR"/>
           </a:p>
@@ -1056,7 +1055,7 @@
             <a:fld id="{73302334-7E8B-4320-A1E2-4B05AC15A670}" type="datetimeFigureOut">
               <a:rPr lang="fr-FR" smtClean="0"/>
               <a:pPr/>
-              <a:t>07/10/2020</a:t>
+              <a:t>13/10/2020</a:t>
             </a:fld>
             <a:endParaRPr lang="fr-FR"/>
           </a:p>
@@ -1338,7 +1337,7 @@
             <a:fld id="{73302334-7E8B-4320-A1E2-4B05AC15A670}" type="datetimeFigureOut">
               <a:rPr lang="fr-FR" smtClean="0"/>
               <a:pPr/>
-              <a:t>07/10/2020</a:t>
+              <a:t>13/10/2020</a:t>
             </a:fld>
             <a:endParaRPr lang="fr-FR"/>
           </a:p>
@@ -1754,7 +1753,7 @@
             <a:fld id="{73302334-7E8B-4320-A1E2-4B05AC15A670}" type="datetimeFigureOut">
               <a:rPr lang="fr-FR" smtClean="0"/>
               <a:pPr/>
-              <a:t>07/10/2020</a:t>
+              <a:t>13/10/2020</a:t>
             </a:fld>
             <a:endParaRPr lang="fr-FR"/>
           </a:p>
@@ -1868,7 +1867,7 @@
             <a:fld id="{73302334-7E8B-4320-A1E2-4B05AC15A670}" type="datetimeFigureOut">
               <a:rPr lang="fr-FR" smtClean="0"/>
               <a:pPr/>
-              <a:t>07/10/2020</a:t>
+              <a:t>13/10/2020</a:t>
             </a:fld>
             <a:endParaRPr lang="fr-FR"/>
           </a:p>
@@ -1960,7 +1959,7 @@
             <a:fld id="{73302334-7E8B-4320-A1E2-4B05AC15A670}" type="datetimeFigureOut">
               <a:rPr lang="fr-FR" smtClean="0"/>
               <a:pPr/>
-              <a:t>07/10/2020</a:t>
+              <a:t>13/10/2020</a:t>
             </a:fld>
             <a:endParaRPr lang="fr-FR"/>
           </a:p>
@@ -2232,7 +2231,7 @@
             <a:fld id="{73302334-7E8B-4320-A1E2-4B05AC15A670}" type="datetimeFigureOut">
               <a:rPr lang="fr-FR" smtClean="0"/>
               <a:pPr/>
-              <a:t>07/10/2020</a:t>
+              <a:t>13/10/2020</a:t>
             </a:fld>
             <a:endParaRPr lang="fr-FR"/>
           </a:p>
@@ -2484,7 +2483,7 @@
             <a:fld id="{73302334-7E8B-4320-A1E2-4B05AC15A670}" type="datetimeFigureOut">
               <a:rPr lang="fr-FR" smtClean="0"/>
               <a:pPr/>
-              <a:t>07/10/2020</a:t>
+              <a:t>13/10/2020</a:t>
             </a:fld>
             <a:endParaRPr lang="fr-FR"/>
           </a:p>
@@ -2692,7 +2691,7 @@
             <a:fld id="{73302334-7E8B-4320-A1E2-4B05AC15A670}" type="datetimeFigureOut">
               <a:rPr lang="fr-FR" smtClean="0"/>
               <a:pPr/>
-              <a:t>07/10/2020</a:t>
+              <a:t>13/10/2020</a:t>
             </a:fld>
             <a:endParaRPr lang="fr-FR"/>
           </a:p>
@@ -3049,6 +3048,901 @@
 <file path=ppt/slides/slide1.xml><?xml version="1.0" encoding="utf-8"?>
 <p:sld xmlns:a="http://schemas.openxmlformats.org/drawingml/2006/main" xmlns:r="http://schemas.openxmlformats.org/officeDocument/2006/relationships" xmlns:p="http://schemas.openxmlformats.org/presentationml/2006/main">
   <p:cSld>
+    <p:bg>
+      <p:bgPr>
+        <a:solidFill>
+          <a:schemeClr val="bg1"/>
+        </a:solidFill>
+        <a:effectLst/>
+      </p:bgPr>
+    </p:bg>
+    <p:spTree>
+      <p:nvGrpSpPr>
+        <p:cNvPr id="1" name=""/>
+        <p:cNvGrpSpPr/>
+        <p:nvPr/>
+      </p:nvGrpSpPr>
+      <p:grpSpPr>
+        <a:xfrm>
+          <a:off x="0" y="0"/>
+          <a:ext cx="0" cy="0"/>
+          <a:chOff x="0" y="0"/>
+          <a:chExt cx="0" cy="0"/>
+        </a:xfrm>
+      </p:grpSpPr>
+      <p:sp useBgFill="1">
+        <p:nvSpPr>
+          <p:cNvPr id="125" name="Rectangle 124">
+            <a:extLst>
+              <a:ext uri="{FF2B5EF4-FFF2-40B4-BE49-F238E27FC236}">
+                <a16:creationId xmlns:a16="http://schemas.microsoft.com/office/drawing/2014/main" id="{5A59F003-E00A-43F9-91DC-CC54E3B87466}"/>
+              </a:ext>
+              <a:ext uri="{C183D7F6-B498-43B3-948B-1728B52AA6E4}">
+                <adec:decorative xmlns:adec="http://schemas.microsoft.com/office/drawing/2017/decorative" val="1"/>
+              </a:ext>
+            </a:extLst>
+          </p:cNvPr>
+          <p:cNvSpPr>
+            <a:spLocks noGrp="1" noRot="1" noChangeAspect="1" noMove="1" noResize="1" noEditPoints="1" noAdjustHandles="1" noChangeArrowheads="1" noChangeShapeType="1" noTextEdit="1"/>
+          </p:cNvSpPr>
+          <p:nvPr>
+            <p:extLst>
+              <p:ext uri="{386F3935-93C4-4BCD-93E2-E3B085C9AB24}">
+                <p16:designElem xmlns:p16="http://schemas.microsoft.com/office/powerpoint/2015/main" val="1"/>
+              </p:ext>
+            </p:extLst>
+          </p:nvPr>
+        </p:nvSpPr>
+        <p:spPr>
+          <a:xfrm>
+            <a:off x="0" y="0"/>
+            <a:ext cx="9144000" cy="6858000"/>
+          </a:xfrm>
+          <a:prstGeom prst="rect">
+            <a:avLst/>
+          </a:prstGeom>
+          <a:ln>
+            <a:noFill/>
+          </a:ln>
+        </p:spPr>
+        <p:style>
+          <a:lnRef idx="2">
+            <a:schemeClr val="accent1">
+              <a:shade val="50000"/>
+            </a:schemeClr>
+          </a:lnRef>
+          <a:fillRef idx="1">
+            <a:schemeClr val="accent1"/>
+          </a:fillRef>
+          <a:effectRef idx="0">
+            <a:schemeClr val="accent1"/>
+          </a:effectRef>
+          <a:fontRef idx="minor">
+            <a:schemeClr val="lt1"/>
+          </a:fontRef>
+        </p:style>
+        <p:txBody>
+          <a:bodyPr rtlCol="0" anchor="ctr"/>
+          <a:lstStyle/>
+          <a:p>
+            <a:pPr algn="ctr"/>
+            <a:endParaRPr lang="en-US"/>
+          </a:p>
+        </p:txBody>
+      </p:sp>
+      <p:pic>
+        <p:nvPicPr>
+          <p:cNvPr id="1080" name="Picture 56" descr="C:\Users\Tom\AppData\Local\Microsoft\Windows\Temporary Internet Files\Content.IE5\KVSBUKP6\MPj04386510000[1].jpg"/>
+          <p:cNvPicPr>
+            <a:picLocks noChangeAspect="1" noChangeArrowheads="1"/>
+          </p:cNvPicPr>
+          <p:nvPr/>
+        </p:nvPicPr>
+        <p:blipFill rotWithShape="1">
+          <a:blip r:embed="rId2" cstate="print"/>
+          <a:srcRect t="34067" r="8385" b="17492"/>
+          <a:stretch/>
+        </p:blipFill>
+        <p:spPr bwMode="auto">
+          <a:xfrm>
+            <a:off x="0" y="0"/>
+            <a:ext cx="9144000" cy="6858000"/>
+          </a:xfrm>
+          <a:prstGeom prst="rect">
+            <a:avLst/>
+          </a:prstGeom>
+          <a:noFill/>
+        </p:spPr>
+      </p:pic>
+      <p:sp>
+        <p:nvSpPr>
+          <p:cNvPr id="127" name="Rectangle 126">
+            <a:extLst>
+              <a:ext uri="{FF2B5EF4-FFF2-40B4-BE49-F238E27FC236}">
+                <a16:creationId xmlns:a16="http://schemas.microsoft.com/office/drawing/2014/main" id="{D74A4382-E3AD-430A-9A1F-DFA3E0E77A7D}"/>
+              </a:ext>
+              <a:ext uri="{C183D7F6-B498-43B3-948B-1728B52AA6E4}">
+                <adec:decorative xmlns:adec="http://schemas.microsoft.com/office/drawing/2017/decorative" val="1"/>
+              </a:ext>
+            </a:extLst>
+          </p:cNvPr>
+          <p:cNvSpPr>
+            <a:spLocks noGrp="1" noRot="1" noChangeAspect="1" noMove="1" noResize="1" noEditPoints="1" noAdjustHandles="1" noChangeArrowheads="1" noChangeShapeType="1" noTextEdit="1"/>
+          </p:cNvSpPr>
+          <p:nvPr>
+            <p:extLst>
+              <p:ext uri="{386F3935-93C4-4BCD-93E2-E3B085C9AB24}">
+                <p16:designElem xmlns:p16="http://schemas.microsoft.com/office/powerpoint/2015/main" val="1"/>
+              </p:ext>
+            </p:extLst>
+          </p:nvPr>
+        </p:nvSpPr>
+        <p:spPr>
+          <a:xfrm rot="16200000">
+            <a:off x="2275867" y="-10136"/>
+            <a:ext cx="4592270" cy="9144001"/>
+          </a:xfrm>
+          <a:prstGeom prst="rect">
+            <a:avLst/>
+          </a:prstGeom>
+          <a:gradFill>
+            <a:gsLst>
+              <a:gs pos="35000">
+                <a:schemeClr val="bg1">
+                  <a:alpha val="46000"/>
+                </a:schemeClr>
+              </a:gs>
+              <a:gs pos="21000">
+                <a:schemeClr val="bg1">
+                  <a:alpha val="30000"/>
+                </a:schemeClr>
+              </a:gs>
+              <a:gs pos="0">
+                <a:schemeClr val="bg1">
+                  <a:alpha val="0"/>
+                </a:schemeClr>
+              </a:gs>
+              <a:gs pos="100000">
+                <a:schemeClr val="bg1">
+                  <a:alpha val="90000"/>
+                </a:schemeClr>
+              </a:gs>
+            </a:gsLst>
+            <a:lin ang="10800000" scaled="0"/>
+          </a:gradFill>
+          <a:ln>
+            <a:noFill/>
+          </a:ln>
+        </p:spPr>
+        <p:style>
+          <a:lnRef idx="2">
+            <a:schemeClr val="accent1">
+              <a:shade val="50000"/>
+            </a:schemeClr>
+          </a:lnRef>
+          <a:fillRef idx="1">
+            <a:schemeClr val="accent1"/>
+          </a:fillRef>
+          <a:effectRef idx="0">
+            <a:schemeClr val="accent1"/>
+          </a:effectRef>
+          <a:fontRef idx="minor">
+            <a:schemeClr val="lt1"/>
+          </a:fontRef>
+        </p:style>
+        <p:txBody>
+          <a:bodyPr rtlCol="0" anchor="ctr"/>
+          <a:lstStyle/>
+          <a:p>
+            <a:pPr algn="ctr"/>
+            <a:endParaRPr lang="en-US" dirty="0"/>
+          </a:p>
+        </p:txBody>
+      </p:sp>
+      <p:sp>
+        <p:nvSpPr>
+          <p:cNvPr id="2" name="Titre 1"/>
+          <p:cNvSpPr>
+            <a:spLocks noGrp="1"/>
+          </p:cNvSpPr>
+          <p:nvPr>
+            <p:ph type="ctrTitle"/>
+          </p:nvPr>
+        </p:nvSpPr>
+        <p:spPr>
+          <a:xfrm>
+            <a:off x="303414" y="3091928"/>
+            <a:ext cx="6808922" cy="2387600"/>
+          </a:xfrm>
+        </p:spPr>
+        <p:txBody>
+          <a:bodyPr>
+            <a:normAutofit/>
+          </a:bodyPr>
+          <a:lstStyle/>
+          <a:p>
+            <a:pPr algn="l"/>
+            <a:r>
+              <a:rPr lang="fr-FR" sz="5700" dirty="0">
+                <a:latin typeface="Algerian" panose="04020705040A02060702" pitchFamily="82" charset="0"/>
+              </a:rPr>
+              <a:t>Probabilité et statistique</a:t>
+            </a:r>
+          </a:p>
+        </p:txBody>
+      </p:sp>
+      <p:sp>
+        <p:nvSpPr>
+          <p:cNvPr id="129" name="Rectangle: Rounded Corners 128">
+            <a:extLst>
+              <a:ext uri="{FF2B5EF4-FFF2-40B4-BE49-F238E27FC236}">
+                <a16:creationId xmlns:a16="http://schemas.microsoft.com/office/drawing/2014/main" id="{79F40191-0F44-4FD1-82CC-ACB507C14BE6}"/>
+              </a:ext>
+              <a:ext uri="{C183D7F6-B498-43B3-948B-1728B52AA6E4}">
+                <adec:decorative xmlns:adec="http://schemas.microsoft.com/office/drawing/2017/decorative" val="1"/>
+              </a:ext>
+            </a:extLst>
+          </p:cNvPr>
+          <p:cNvSpPr>
+            <a:spLocks noGrp="1" noRot="1" noChangeAspect="1" noMove="1" noResize="1" noEditPoints="1" noAdjustHandles="1" noChangeArrowheads="1" noChangeShapeType="1" noTextEdit="1"/>
+          </p:cNvSpPr>
+          <p:nvPr>
+            <p:extLst>
+              <p:ext uri="{386F3935-93C4-4BCD-93E2-E3B085C9AB24}">
+                <p16:designElem xmlns:p16="http://schemas.microsoft.com/office/powerpoint/2015/main" val="1"/>
+              </p:ext>
+            </p:extLst>
+          </p:nvPr>
+        </p:nvSpPr>
+        <p:spPr>
+          <a:xfrm>
+            <a:off x="0" y="5575039"/>
+            <a:ext cx="7339422" cy="685800"/>
+          </a:xfrm>
+          <a:prstGeom prst="roundRect">
+            <a:avLst>
+              <a:gd name="adj" fmla="val 0"/>
+            </a:avLst>
+          </a:prstGeom>
+          <a:solidFill>
+            <a:schemeClr val="accent2"/>
+          </a:solidFill>
+          <a:ln>
+            <a:noFill/>
+          </a:ln>
+        </p:spPr>
+        <p:style>
+          <a:lnRef idx="2">
+            <a:schemeClr val="accent1">
+              <a:shade val="50000"/>
+            </a:schemeClr>
+          </a:lnRef>
+          <a:fillRef idx="1">
+            <a:schemeClr val="accent1"/>
+          </a:fillRef>
+          <a:effectRef idx="0">
+            <a:schemeClr val="accent1"/>
+          </a:effectRef>
+          <a:fontRef idx="minor">
+            <a:schemeClr val="lt1"/>
+          </a:fontRef>
+        </p:style>
+        <p:txBody>
+          <a:bodyPr rtlCol="0" anchor="ctr"/>
+          <a:lstStyle/>
+          <a:p>
+            <a:pPr algn="ctr"/>
+            <a:endParaRPr lang="en-US"/>
+          </a:p>
+        </p:txBody>
+      </p:sp>
+      <p:sp>
+        <p:nvSpPr>
+          <p:cNvPr id="3" name="Sous-titre 2"/>
+          <p:cNvSpPr>
+            <a:spLocks noGrp="1"/>
+          </p:cNvSpPr>
+          <p:nvPr>
+            <p:ph type="subTitle" idx="1"/>
+          </p:nvPr>
+        </p:nvSpPr>
+        <p:spPr>
+          <a:xfrm>
+            <a:off x="303414" y="5624945"/>
+            <a:ext cx="6808922" cy="592975"/>
+          </a:xfrm>
+        </p:spPr>
+        <p:txBody>
+          <a:bodyPr anchor="ctr">
+            <a:normAutofit/>
+          </a:bodyPr>
+          <a:lstStyle/>
+          <a:p>
+            <a:pPr algn="l"/>
+            <a:r>
+              <a:rPr lang="fr-FR">
+                <a:latin typeface="Algerian" panose="04020705040A02060702" pitchFamily="82" charset="0"/>
+              </a:rPr>
+              <a:t>Le foot et les moindres carrés</a:t>
+            </a:r>
+          </a:p>
+        </p:txBody>
+      </p:sp>
+    </p:spTree>
+  </p:cSld>
+  <p:clrMapOvr>
+    <a:overrideClrMapping bg1="dk1" tx1="lt1" bg2="dk2" tx2="lt2" accent1="accent1" accent2="accent2" accent3="accent3" accent4="accent4" accent5="accent5" accent6="accent6" hlink="hlink" folHlink="folHlink"/>
+  </p:clrMapOvr>
+</p:sld>
+</file>
+
+<file path=ppt/slides/slide2.xml><?xml version="1.0" encoding="utf-8"?>
+<p:sld xmlns:a="http://schemas.openxmlformats.org/drawingml/2006/main" xmlns:r="http://schemas.openxmlformats.org/officeDocument/2006/relationships" xmlns:p="http://schemas.openxmlformats.org/presentationml/2006/main">
+  <p:cSld>
+    <p:bg>
+      <p:bgPr>
+        <a:solidFill>
+          <a:schemeClr val="bg1"/>
+        </a:solidFill>
+        <a:effectLst/>
+      </p:bgPr>
+    </p:bg>
+    <p:spTree>
+      <p:nvGrpSpPr>
+        <p:cNvPr id="1" name=""/>
+        <p:cNvGrpSpPr/>
+        <p:nvPr/>
+      </p:nvGrpSpPr>
+      <p:grpSpPr>
+        <a:xfrm>
+          <a:off x="0" y="0"/>
+          <a:ext cx="0" cy="0"/>
+          <a:chOff x="0" y="0"/>
+          <a:chExt cx="0" cy="0"/>
+        </a:xfrm>
+      </p:grpSpPr>
+      <p:sp>
+        <p:nvSpPr>
+          <p:cNvPr id="2" name="Titre 1"/>
+          <p:cNvSpPr>
+            <a:spLocks noGrp="1"/>
+          </p:cNvSpPr>
+          <p:nvPr>
+            <p:ph type="title"/>
+          </p:nvPr>
+        </p:nvSpPr>
+        <p:spPr>
+          <a:xfrm>
+            <a:off x="491490" y="365125"/>
+            <a:ext cx="3840085" cy="1692794"/>
+          </a:xfrm>
+        </p:spPr>
+        <p:txBody>
+          <a:bodyPr>
+            <a:normAutofit/>
+          </a:bodyPr>
+          <a:lstStyle/>
+          <a:p>
+            <a:r>
+              <a:rPr lang="fr-FR">
+                <a:latin typeface="Algerian" panose="04020705040A02060702" pitchFamily="82" charset="0"/>
+              </a:rPr>
+              <a:t>Partie Nino</a:t>
+            </a:r>
+          </a:p>
+        </p:txBody>
+      </p:sp>
+      <p:cxnSp>
+        <p:nvCxnSpPr>
+          <p:cNvPr id="125" name="Straight Arrow Connector 124">
+            <a:extLst>
+              <a:ext uri="{FF2B5EF4-FFF2-40B4-BE49-F238E27FC236}">
+                <a16:creationId xmlns:a16="http://schemas.microsoft.com/office/drawing/2014/main" id="{E4A809D5-3600-46D4-A466-67F2349A54FB}"/>
+              </a:ext>
+              <a:ext uri="{C183D7F6-B498-43B3-948B-1728B52AA6E4}">
+                <adec:decorative xmlns:adec="http://schemas.microsoft.com/office/drawing/2017/decorative" val="1"/>
+              </a:ext>
+            </a:extLst>
+          </p:cNvPr>
+          <p:cNvCxnSpPr>
+            <a:cxnSpLocks noGrp="1" noRot="1" noChangeAspect="1" noMove="1" noResize="1" noEditPoints="1" noAdjustHandles="1" noChangeArrowheads="1" noChangeShapeType="1"/>
+          </p:cNvCxnSpPr>
+          <p:nvPr>
+            <p:extLst>
+              <p:ext uri="{386F3935-93C4-4BCD-93E2-E3B085C9AB24}">
+                <p16:designElem xmlns:p16="http://schemas.microsoft.com/office/powerpoint/2015/main" val="1"/>
+              </p:ext>
+            </p:extLst>
+          </p:nvPr>
+        </p:nvCxnSpPr>
+        <p:spPr>
+          <a:xfrm>
+            <a:off x="491490" y="2316480"/>
+            <a:ext cx="3429000" cy="0"/>
+          </a:xfrm>
+          <a:prstGeom prst="straightConnector1">
+            <a:avLst/>
+          </a:prstGeom>
+          <a:ln w="19050" cap="sq">
+            <a:solidFill>
+              <a:schemeClr val="tx1"/>
+            </a:solidFill>
+            <a:tailEnd type="none"/>
+          </a:ln>
+        </p:spPr>
+        <p:style>
+          <a:lnRef idx="1">
+            <a:schemeClr val="accent1"/>
+          </a:lnRef>
+          <a:fillRef idx="0">
+            <a:schemeClr val="accent1"/>
+          </a:fillRef>
+          <a:effectRef idx="0">
+            <a:schemeClr val="accent1"/>
+          </a:effectRef>
+          <a:fontRef idx="minor">
+            <a:schemeClr val="tx1"/>
+          </a:fontRef>
+        </p:style>
+      </p:cxnSp>
+      <p:sp>
+        <p:nvSpPr>
+          <p:cNvPr id="3" name="Sous-titre 2"/>
+          <p:cNvSpPr>
+            <a:spLocks noGrp="1"/>
+          </p:cNvSpPr>
+          <p:nvPr>
+            <p:ph idx="1"/>
+          </p:nvPr>
+        </p:nvSpPr>
+        <p:spPr>
+          <a:xfrm>
+            <a:off x="491490" y="2575034"/>
+            <a:ext cx="3840085" cy="3462228"/>
+          </a:xfrm>
+        </p:spPr>
+        <p:txBody>
+          <a:bodyPr>
+            <a:normAutofit/>
+          </a:bodyPr>
+          <a:lstStyle/>
+          <a:p>
+            <a:r>
+              <a:rPr lang="fr-FR" sz="1600">
+                <a:latin typeface="Algerian" panose="04020705040A02060702" pitchFamily="82" charset="0"/>
+              </a:rPr>
+              <a:t>Introduction</a:t>
+            </a:r>
+          </a:p>
+        </p:txBody>
+      </p:sp>
+      <p:pic>
+        <p:nvPicPr>
+          <p:cNvPr id="1080" name="Picture 56" descr="C:\Users\Tom\AppData\Local\Microsoft\Windows\Temporary Internet Files\Content.IE5\KVSBUKP6\MPj04386510000[1].jpg"/>
+          <p:cNvPicPr>
+            <a:picLocks noChangeAspect="1" noChangeArrowheads="1"/>
+          </p:cNvPicPr>
+          <p:nvPr/>
+        </p:nvPicPr>
+        <p:blipFill rotWithShape="1">
+          <a:blip r:embed="rId2" cstate="print"/>
+          <a:srcRect r="2069"/>
+          <a:stretch/>
+        </p:blipFill>
+        <p:spPr bwMode="auto">
+          <a:xfrm>
+            <a:off x="4409136" y="10"/>
+            <a:ext cx="4734863" cy="6857987"/>
+          </a:xfrm>
+          <a:custGeom>
+            <a:avLst/>
+            <a:gdLst/>
+            <a:ahLst/>
+            <a:cxnLst/>
+            <a:rect l="l" t="t" r="r" b="b"/>
+            <a:pathLst>
+              <a:path w="6313150" h="6857997">
+                <a:moveTo>
+                  <a:pt x="65565" y="0"/>
+                </a:moveTo>
+                <a:lnTo>
+                  <a:pt x="6313150" y="0"/>
+                </a:lnTo>
+                <a:lnTo>
+                  <a:pt x="6313150" y="6857997"/>
+                </a:lnTo>
+                <a:lnTo>
+                  <a:pt x="3293946" y="6857997"/>
+                </a:lnTo>
+                <a:lnTo>
+                  <a:pt x="3235857" y="6823061"/>
+                </a:lnTo>
+                <a:cubicBezTo>
+                  <a:pt x="1291240" y="5592803"/>
+                  <a:pt x="0" y="3423096"/>
+                  <a:pt x="0" y="951803"/>
+                </a:cubicBezTo>
+                <a:cubicBezTo>
+                  <a:pt x="0" y="727140"/>
+                  <a:pt x="10673" y="504970"/>
+                  <a:pt x="31536" y="285771"/>
+                </a:cubicBezTo>
+                <a:close/>
+              </a:path>
+            </a:pathLst>
+          </a:custGeom>
+          <a:noFill/>
+        </p:spPr>
+      </p:pic>
+      <p:pic>
+        <p:nvPicPr>
+          <p:cNvPr id="5" name="Image 4">
+            <a:extLst>
+              <a:ext uri="{FF2B5EF4-FFF2-40B4-BE49-F238E27FC236}">
+                <a16:creationId xmlns:a16="http://schemas.microsoft.com/office/drawing/2014/main" id="{DC5BD358-60FF-458B-9A4C-FBE32E2720E5}"/>
+              </a:ext>
+            </a:extLst>
+          </p:cNvPr>
+          <p:cNvPicPr>
+            <a:picLocks noChangeAspect="1"/>
+          </p:cNvPicPr>
+          <p:nvPr/>
+        </p:nvPicPr>
+        <p:blipFill>
+          <a:blip r:embed="rId3">
+            <a:extLst>
+              <a:ext uri="{28A0092B-C50C-407E-A947-70E740481C1C}">
+                <a14:useLocalDpi xmlns:a14="http://schemas.microsoft.com/office/drawing/2010/main" val="0"/>
+              </a:ext>
+            </a:extLst>
+          </a:blip>
+          <a:stretch>
+            <a:fillRect/>
+          </a:stretch>
+        </p:blipFill>
+        <p:spPr>
+          <a:xfrm>
+            <a:off x="760532" y="3313559"/>
+            <a:ext cx="3302000" cy="3149600"/>
+          </a:xfrm>
+          <a:prstGeom prst="rect">
+            <a:avLst/>
+          </a:prstGeom>
+        </p:spPr>
+      </p:pic>
+    </p:spTree>
+    <p:extLst>
+      <p:ext uri="{BB962C8B-B14F-4D97-AF65-F5344CB8AC3E}">
+        <p14:creationId xmlns:p14="http://schemas.microsoft.com/office/powerpoint/2010/main" val="3140014808"/>
+      </p:ext>
+    </p:extLst>
+  </p:cSld>
+  <p:clrMapOvr>
+    <a:masterClrMapping/>
+  </p:clrMapOvr>
+</p:sld>
+</file>
+
+<file path=ppt/slides/slide3.xml><?xml version="1.0" encoding="utf-8"?>
+<p:sld xmlns:a="http://schemas.openxmlformats.org/drawingml/2006/main" xmlns:r="http://schemas.openxmlformats.org/officeDocument/2006/relationships" xmlns:p="http://schemas.openxmlformats.org/presentationml/2006/main">
+  <p:cSld>
+    <p:bg>
+      <p:bgPr>
+        <a:solidFill>
+          <a:schemeClr val="bg1">
+            <a:tint val="95000"/>
+            <a:satMod val="170000"/>
+          </a:schemeClr>
+        </a:solidFill>
+        <a:effectLst/>
+      </p:bgPr>
+    </p:bg>
+    <p:spTree>
+      <p:nvGrpSpPr>
+        <p:cNvPr id="1" name=""/>
+        <p:cNvGrpSpPr/>
+        <p:nvPr/>
+      </p:nvGrpSpPr>
+      <p:grpSpPr>
+        <a:xfrm>
+          <a:off x="0" y="0"/>
+          <a:ext cx="0" cy="0"/>
+          <a:chOff x="0" y="0"/>
+          <a:chExt cx="0" cy="0"/>
+        </a:xfrm>
+      </p:grpSpPr>
+      <p:sp>
+        <p:nvSpPr>
+          <p:cNvPr id="2" name="Titre 1"/>
+          <p:cNvSpPr>
+            <a:spLocks noGrp="1"/>
+          </p:cNvSpPr>
+          <p:nvPr>
+            <p:ph type="title"/>
+          </p:nvPr>
+        </p:nvSpPr>
+        <p:spPr>
+          <a:xfrm>
+            <a:off x="5598460" y="1783959"/>
+            <a:ext cx="3065480" cy="2889114"/>
+          </a:xfrm>
+        </p:spPr>
+        <p:txBody>
+          <a:bodyPr vert="horz" lIns="91440" tIns="45720" rIns="91440" bIns="45720" rtlCol="0" anchor="b">
+            <a:normAutofit/>
+          </a:bodyPr>
+          <a:lstStyle/>
+          <a:p>
+            <a:pPr algn="l">
+              <a:lnSpc>
+                <a:spcPct val="90000"/>
+              </a:lnSpc>
+            </a:pPr>
+            <a:r>
+              <a:rPr lang="en-US" sz="4700"/>
+              <a:t>Partie Nino</a:t>
+            </a:r>
+          </a:p>
+        </p:txBody>
+      </p:sp>
+      <p:sp>
+        <p:nvSpPr>
+          <p:cNvPr id="3" name="Sous-titre 2"/>
+          <p:cNvSpPr>
+            <a:spLocks noGrp="1"/>
+          </p:cNvSpPr>
+          <p:nvPr>
+            <p:ph idx="1"/>
+          </p:nvPr>
+        </p:nvSpPr>
+        <p:spPr>
+          <a:xfrm>
+            <a:off x="5598459" y="4750893"/>
+            <a:ext cx="3065478" cy="1147863"/>
+          </a:xfrm>
+        </p:spPr>
+        <p:txBody>
+          <a:bodyPr vert="horz" lIns="91440" tIns="45720" rIns="91440" bIns="45720" rtlCol="0" anchor="t">
+            <a:normAutofit/>
+          </a:bodyPr>
+          <a:lstStyle/>
+          <a:p>
+            <a:pPr marL="0" indent="0">
+              <a:lnSpc>
+                <a:spcPct val="90000"/>
+              </a:lnSpc>
+              <a:spcBef>
+                <a:spcPts val="1000"/>
+              </a:spcBef>
+              <a:buNone/>
+            </a:pPr>
+            <a:r>
+              <a:rPr lang="en-US" sz="1700"/>
+              <a:t>Présentation</a:t>
+            </a:r>
+          </a:p>
+        </p:txBody>
+      </p:sp>
+      <p:sp>
+        <p:nvSpPr>
+          <p:cNvPr id="125" name="Freeform: Shape 124">
+            <a:extLst>
+              <a:ext uri="{FF2B5EF4-FFF2-40B4-BE49-F238E27FC236}">
+                <a16:creationId xmlns:a16="http://schemas.microsoft.com/office/drawing/2014/main" id="{E49CC64F-7275-4E33-961B-0C5CDC439875}"/>
+              </a:ext>
+              <a:ext uri="{C183D7F6-B498-43B3-948B-1728B52AA6E4}">
+                <adec:decorative xmlns:adec="http://schemas.microsoft.com/office/drawing/2017/decorative" val="1"/>
+              </a:ext>
+            </a:extLst>
+          </p:cNvPr>
+          <p:cNvSpPr>
+            <a:spLocks noGrp="1" noRot="1" noChangeAspect="1" noMove="1" noResize="1" noEditPoints="1" noAdjustHandles="1" noChangeArrowheads="1" noChangeShapeType="1" noTextEdit="1"/>
+          </p:cNvSpPr>
+          <p:nvPr>
+            <p:extLst>
+              <p:ext uri="{386F3935-93C4-4BCD-93E2-E3B085C9AB24}">
+                <p16:designElem xmlns:p16="http://schemas.microsoft.com/office/powerpoint/2015/main" val="1"/>
+              </p:ext>
+            </p:extLst>
+          </p:nvPr>
+        </p:nvSpPr>
+        <p:spPr>
+          <a:xfrm flipH="1" flipV="1">
+            <a:off x="0" y="0"/>
+            <a:ext cx="5391039" cy="6858000"/>
+          </a:xfrm>
+          <a:custGeom>
+            <a:avLst/>
+            <a:gdLst>
+              <a:gd name="connsiteX0" fmla="*/ 7188051 w 7188051"/>
+              <a:gd name="connsiteY0" fmla="*/ 6858000 h 6858000"/>
+              <a:gd name="connsiteX1" fmla="*/ 108694 w 7188051"/>
+              <a:gd name="connsiteY1" fmla="*/ 6858000 h 6858000"/>
+              <a:gd name="connsiteX2" fmla="*/ 79127 w 7188051"/>
+              <a:gd name="connsiteY2" fmla="*/ 6681235 h 6858000"/>
+              <a:gd name="connsiteX3" fmla="*/ 0 w 7188051"/>
+              <a:gd name="connsiteY3" fmla="*/ 5565888 h 6858000"/>
+              <a:gd name="connsiteX4" fmla="*/ 2190696 w 7188051"/>
+              <a:gd name="connsiteY4" fmla="*/ 145339 h 6858000"/>
+              <a:gd name="connsiteX5" fmla="*/ 2339431 w 7188051"/>
+              <a:gd name="connsiteY5" fmla="*/ 0 h 6858000"/>
+              <a:gd name="connsiteX6" fmla="*/ 7188051 w 7188051"/>
+              <a:gd name="connsiteY6" fmla="*/ 0 h 6858000"/>
+            </a:gdLst>
+            <a:ahLst/>
+            <a:cxnLst>
+              <a:cxn ang="0">
+                <a:pos x="connsiteX0" y="connsiteY0"/>
+              </a:cxn>
+              <a:cxn ang="0">
+                <a:pos x="connsiteX1" y="connsiteY1"/>
+              </a:cxn>
+              <a:cxn ang="0">
+                <a:pos x="connsiteX2" y="connsiteY2"/>
+              </a:cxn>
+              <a:cxn ang="0">
+                <a:pos x="connsiteX3" y="connsiteY3"/>
+              </a:cxn>
+              <a:cxn ang="0">
+                <a:pos x="connsiteX4" y="connsiteY4"/>
+              </a:cxn>
+              <a:cxn ang="0">
+                <a:pos x="connsiteX5" y="connsiteY5"/>
+              </a:cxn>
+              <a:cxn ang="0">
+                <a:pos x="connsiteX6" y="connsiteY6"/>
+              </a:cxn>
+            </a:cxnLst>
+            <a:rect l="l" t="t" r="r" b="b"/>
+            <a:pathLst>
+              <a:path w="7188051" h="6858000">
+                <a:moveTo>
+                  <a:pt x="7188051" y="6858000"/>
+                </a:moveTo>
+                <a:lnTo>
+                  <a:pt x="108694" y="6858000"/>
+                </a:lnTo>
+                <a:lnTo>
+                  <a:pt x="79127" y="6681235"/>
+                </a:lnTo>
+                <a:cubicBezTo>
+                  <a:pt x="26981" y="6316967"/>
+                  <a:pt x="0" y="5944579"/>
+                  <a:pt x="0" y="5565888"/>
+                </a:cubicBezTo>
+                <a:cubicBezTo>
+                  <a:pt x="0" y="3459953"/>
+                  <a:pt x="834428" y="1548908"/>
+                  <a:pt x="2190696" y="145339"/>
+                </a:cubicBezTo>
+                <a:lnTo>
+                  <a:pt x="2339431" y="0"/>
+                </a:lnTo>
+                <a:lnTo>
+                  <a:pt x="7188051" y="0"/>
+                </a:lnTo>
+                <a:close/>
+              </a:path>
+            </a:pathLst>
+          </a:custGeom>
+          <a:solidFill>
+            <a:schemeClr val="tx1">
+              <a:alpha val="80000"/>
+            </a:schemeClr>
+          </a:solidFill>
+          <a:ln>
+            <a:noFill/>
+          </a:ln>
+        </p:spPr>
+        <p:style>
+          <a:lnRef idx="2">
+            <a:schemeClr val="accent1">
+              <a:shade val="50000"/>
+            </a:schemeClr>
+          </a:lnRef>
+          <a:fillRef idx="1">
+            <a:schemeClr val="accent1"/>
+          </a:fillRef>
+          <a:effectRef idx="0">
+            <a:schemeClr val="accent1"/>
+          </a:effectRef>
+          <a:fontRef idx="minor">
+            <a:schemeClr val="lt1"/>
+          </a:fontRef>
+        </p:style>
+        <p:txBody>
+          <a:bodyPr wrap="square" rtlCol="0" anchor="ctr">
+            <a:noAutofit/>
+          </a:bodyPr>
+          <a:lstStyle/>
+          <a:p>
+            <a:pPr algn="ctr"/>
+            <a:endParaRPr lang="en-US"/>
+          </a:p>
+        </p:txBody>
+      </p:sp>
+      <p:pic>
+        <p:nvPicPr>
+          <p:cNvPr id="1080" name="Picture 56" descr="C:\Users\Tom\AppData\Local\Microsoft\Windows\Temporary Internet Files\Content.IE5\KVSBUKP6\MPj04386510000[1].jpg"/>
+          <p:cNvPicPr>
+            <a:picLocks noChangeAspect="1" noChangeArrowheads="1"/>
+          </p:cNvPicPr>
+          <p:nvPr/>
+        </p:nvPicPr>
+        <p:blipFill rotWithShape="1">
+          <a:blip r:embed="rId2" cstate="print"/>
+          <a:srcRect t="1407" r="1" b="6874"/>
+          <a:stretch/>
+        </p:blipFill>
+        <p:spPr bwMode="auto">
+          <a:xfrm>
+            <a:off x="20" y="10"/>
+            <a:ext cx="5271352" cy="6857990"/>
+          </a:xfrm>
+          <a:custGeom>
+            <a:avLst/>
+            <a:gdLst/>
+            <a:ahLst/>
+            <a:cxnLst/>
+            <a:rect l="l" t="t" r="r" b="b"/>
+            <a:pathLst>
+              <a:path w="7028495" h="6858000">
+                <a:moveTo>
+                  <a:pt x="0" y="0"/>
+                </a:moveTo>
+                <a:lnTo>
+                  <a:pt x="6915668" y="0"/>
+                </a:lnTo>
+                <a:lnTo>
+                  <a:pt x="6952411" y="219663"/>
+                </a:lnTo>
+                <a:cubicBezTo>
+                  <a:pt x="7002551" y="569921"/>
+                  <a:pt x="7028495" y="927986"/>
+                  <a:pt x="7028495" y="1292112"/>
+                </a:cubicBezTo>
+                <a:cubicBezTo>
+                  <a:pt x="7028495" y="3343346"/>
+                  <a:pt x="6205186" y="5202289"/>
+                  <a:pt x="4870994" y="6556512"/>
+                </a:cubicBezTo>
+                <a:lnTo>
+                  <a:pt x="4556185" y="6858000"/>
+                </a:lnTo>
+                <a:lnTo>
+                  <a:pt x="0" y="6858000"/>
+                </a:lnTo>
+                <a:close/>
+              </a:path>
+            </a:pathLst>
+          </a:custGeom>
+          <a:noFill/>
+        </p:spPr>
+      </p:pic>
+    </p:spTree>
+    <p:extLst>
+      <p:ext uri="{BB962C8B-B14F-4D97-AF65-F5344CB8AC3E}">
+        <p14:creationId xmlns:p14="http://schemas.microsoft.com/office/powerpoint/2010/main" val="2451872810"/>
+      </p:ext>
+    </p:extLst>
+  </p:cSld>
+  <p:clrMapOvr>
+    <a:overrideClrMapping bg1="dk1" tx1="lt1" bg2="dk2" tx2="lt2" accent1="accent1" accent2="accent2" accent3="accent3" accent4="accent4" accent5="accent5" accent6="accent6" hlink="hlink" folHlink="folHlink"/>
+  </p:clrMapOvr>
+</p:sld>
+</file>
+
+<file path=ppt/slides/slide4.xml><?xml version="1.0" encoding="utf-8"?>
+<p:sld xmlns:a="http://schemas.openxmlformats.org/drawingml/2006/main" xmlns:r="http://schemas.openxmlformats.org/officeDocument/2006/relationships" xmlns:p="http://schemas.openxmlformats.org/presentationml/2006/main">
+  <p:cSld>
+    <p:bg>
+      <p:bgPr>
+        <a:solidFill>
+          <a:schemeClr val="bg1"/>
+        </a:solidFill>
+        <a:effectLst/>
+      </p:bgPr>
+    </p:bg>
     <p:spTree>
       <p:nvGrpSpPr>
         <p:cNvPr id="1" name=""/>
@@ -3071,17 +3965,17 @@
           </p:cNvPicPr>
           <p:nvPr/>
         </p:nvPicPr>
-        <p:blipFill>
-          <a:blip r:embed="rId2" cstate="print"/>
-          <a:srcRect/>
-          <a:stretch>
-            <a:fillRect/>
-          </a:stretch>
+        <p:blipFill rotWithShape="1">
+          <a:blip r:embed="rId2" cstate="print">
+            <a:alphaModFix/>
+          </a:blip>
+          <a:srcRect r="812"/>
+          <a:stretch/>
         </p:blipFill>
         <p:spPr bwMode="auto">
           <a:xfrm>
-            <a:off x="0" y="0"/>
-            <a:ext cx="9144000" cy="6858000"/>
+            <a:off x="4348157" y="10"/>
+            <a:ext cx="4795614" cy="6857990"/>
           </a:xfrm>
           <a:prstGeom prst="rect">
             <a:avLst/>
@@ -3089,106 +3983,49 @@
           <a:noFill/>
         </p:spPr>
       </p:pic>
-      <p:sp>
-        <p:nvSpPr>
-          <p:cNvPr id="2" name="Titre 1"/>
-          <p:cNvSpPr>
-            <a:spLocks noGrp="1"/>
-          </p:cNvSpPr>
-          <p:nvPr>
-            <p:ph type="ctrTitle"/>
-          </p:nvPr>
-        </p:nvSpPr>
-        <p:spPr/>
-        <p:txBody>
-          <a:bodyPr/>
-          <a:lstStyle/>
-          <a:p>
-            <a:r>
-              <a:rPr lang="fr-FR" dirty="0">
-                <a:latin typeface="Algerian" panose="04020705040A02060702" pitchFamily="82" charset="0"/>
-              </a:rPr>
-              <a:t>Probabilité et statistique</a:t>
-            </a:r>
-          </a:p>
-        </p:txBody>
-      </p:sp>
-      <p:sp>
-        <p:nvSpPr>
-          <p:cNvPr id="3" name="Sous-titre 2"/>
-          <p:cNvSpPr>
-            <a:spLocks noGrp="1"/>
-          </p:cNvSpPr>
-          <p:nvPr>
-            <p:ph type="subTitle" idx="1"/>
-          </p:nvPr>
-        </p:nvSpPr>
-        <p:spPr/>
-        <p:txBody>
-          <a:bodyPr/>
-          <a:lstStyle/>
-          <a:p>
-            <a:r>
-              <a:rPr lang="fr-FR" dirty="0">
-                <a:solidFill>
-                  <a:srgbClr val="FF0000"/>
-                </a:solidFill>
-                <a:latin typeface="Algerian" panose="04020705040A02060702" pitchFamily="82" charset="0"/>
-              </a:rPr>
-              <a:t>Le foot et les moindres carrés</a:t>
-            </a:r>
-          </a:p>
-        </p:txBody>
-      </p:sp>
-    </p:spTree>
-  </p:cSld>
-  <p:clrMapOvr>
-    <a:masterClrMapping/>
-  </p:clrMapOvr>
-</p:sld>
-</file>
-
-<file path=ppt/slides/slide2.xml><?xml version="1.0" encoding="utf-8"?>
-<p:sld xmlns:a="http://schemas.openxmlformats.org/drawingml/2006/main" xmlns:r="http://schemas.openxmlformats.org/officeDocument/2006/relationships" xmlns:p="http://schemas.openxmlformats.org/presentationml/2006/main">
-  <p:cSld>
-    <p:spTree>
-      <p:nvGrpSpPr>
-        <p:cNvPr id="1" name=""/>
-        <p:cNvGrpSpPr/>
-        <p:nvPr/>
-      </p:nvGrpSpPr>
-      <p:grpSpPr>
-        <a:xfrm>
-          <a:off x="0" y="0"/>
-          <a:ext cx="0" cy="0"/>
-          <a:chOff x="0" y="0"/>
-          <a:chExt cx="0" cy="0"/>
-        </a:xfrm>
-      </p:grpSpPr>
       <p:pic>
         <p:nvPicPr>
-          <p:cNvPr id="1080" name="Picture 56" descr="C:\Users\Tom\AppData\Local\Microsoft\Windows\Temporary Internet Files\Content.IE5\KVSBUKP6\MPj04386510000[1].jpg"/>
+          <p:cNvPr id="125" name="Picture 124">
+            <a:extLst>
+              <a:ext uri="{FF2B5EF4-FFF2-40B4-BE49-F238E27FC236}">
+                <a16:creationId xmlns:a16="http://schemas.microsoft.com/office/drawing/2014/main" id="{54DDEBDD-D8BD-41A6-8A0D-B00E3768B0F9}"/>
+              </a:ext>
+              <a:ext uri="{C183D7F6-B498-43B3-948B-1728B52AA6E4}">
+                <adec:decorative xmlns:adec="http://schemas.microsoft.com/office/drawing/2017/decorative" val="1"/>
+              </a:ext>
+            </a:extLst>
+          </p:cNvPr>
           <p:cNvPicPr>
-            <a:picLocks noChangeAspect="1" noChangeArrowheads="1"/>
+            <a:picLocks noGrp="1" noRot="1" noChangeAspect="1" noMove="1" noResize="1" noEditPoints="1" noAdjustHandles="1" noChangeArrowheads="1" noChangeShapeType="1" noCrop="1"/>
           </p:cNvPicPr>
-          <p:nvPr/>
+          <p:nvPr>
+            <p:extLst>
+              <p:ext uri="{386F3935-93C4-4BCD-93E2-E3B085C9AB24}">
+                <p16:designElem xmlns:p16="http://schemas.microsoft.com/office/powerpoint/2015/main" val="1"/>
+              </p:ext>
+            </p:extLst>
+          </p:nvPr>
         </p:nvPicPr>
         <p:blipFill>
-          <a:blip r:embed="rId2" cstate="print"/>
-          <a:srcRect/>
+          <a:blip r:embed="rId3">
+            <a:extLst>
+              <a:ext uri="{28A0092B-C50C-407E-A947-70E740481C1C}">
+                <a14:useLocalDpi xmlns:a14="http://schemas.microsoft.com/office/drawing/2010/main" val="0"/>
+              </a:ext>
+            </a:extLst>
+          </a:blip>
           <a:stretch>
             <a:fillRect/>
           </a:stretch>
         </p:blipFill>
-        <p:spPr bwMode="auto">
-          <a:xfrm>
+        <p:spPr>
+          <a:xfrm flipH="1" flipV="1">
             <a:off x="0" y="0"/>
             <a:ext cx="9144000" cy="6858000"/>
           </a:xfrm>
           <a:prstGeom prst="rect">
             <a:avLst/>
           </a:prstGeom>
-          <a:noFill/>
         </p:spPr>
       </p:pic>
       <p:sp>
@@ -3201,235 +4038,22 @@
             <p:ph type="title"/>
           </p:nvPr>
         </p:nvSpPr>
-        <p:spPr/>
-        <p:txBody>
-          <a:bodyPr/>
+        <p:spPr>
+          <a:xfrm>
+            <a:off x="603748" y="823612"/>
+            <a:ext cx="3602727" cy="1311664"/>
+          </a:xfrm>
+        </p:spPr>
+        <p:txBody>
+          <a:bodyPr>
+            <a:normAutofit/>
+          </a:bodyPr>
           <a:lstStyle/>
           <a:p>
             <a:r>
-              <a:rPr lang="fr-FR" dirty="0">
+              <a:rPr lang="fr-FR">
                 <a:solidFill>
-                  <a:srgbClr val="FF0000"/>
-                </a:solidFill>
-                <a:latin typeface="Algerian" panose="04020705040A02060702" pitchFamily="82" charset="0"/>
-              </a:rPr>
-              <a:t>Partie Nino</a:t>
-            </a:r>
-          </a:p>
-        </p:txBody>
-      </p:sp>
-      <p:sp>
-        <p:nvSpPr>
-          <p:cNvPr id="3" name="Sous-titre 2"/>
-          <p:cNvSpPr>
-            <a:spLocks noGrp="1"/>
-          </p:cNvSpPr>
-          <p:nvPr>
-            <p:ph idx="1"/>
-          </p:nvPr>
-        </p:nvSpPr>
-        <p:spPr/>
-        <p:txBody>
-          <a:bodyPr/>
-          <a:lstStyle/>
-          <a:p>
-            <a:r>
-              <a:rPr lang="fr-FR" dirty="0">
-                <a:solidFill>
-                  <a:srgbClr val="FF0000"/>
-                </a:solidFill>
-                <a:latin typeface="Algerian" panose="04020705040A02060702" pitchFamily="82" charset="0"/>
-              </a:rPr>
-              <a:t>Introduction</a:t>
-            </a:r>
-          </a:p>
-        </p:txBody>
-      </p:sp>
-    </p:spTree>
-    <p:extLst>
-      <p:ext uri="{BB962C8B-B14F-4D97-AF65-F5344CB8AC3E}">
-        <p14:creationId xmlns:p14="http://schemas.microsoft.com/office/powerpoint/2010/main" val="3140014808"/>
-      </p:ext>
-    </p:extLst>
-  </p:cSld>
-  <p:clrMapOvr>
-    <a:masterClrMapping/>
-  </p:clrMapOvr>
-</p:sld>
-</file>
-
-<file path=ppt/slides/slide3.xml><?xml version="1.0" encoding="utf-8"?>
-<p:sld xmlns:a="http://schemas.openxmlformats.org/drawingml/2006/main" xmlns:r="http://schemas.openxmlformats.org/officeDocument/2006/relationships" xmlns:p="http://schemas.openxmlformats.org/presentationml/2006/main">
-  <p:cSld>
-    <p:spTree>
-      <p:nvGrpSpPr>
-        <p:cNvPr id="1" name=""/>
-        <p:cNvGrpSpPr/>
-        <p:nvPr/>
-      </p:nvGrpSpPr>
-      <p:grpSpPr>
-        <a:xfrm>
-          <a:off x="0" y="0"/>
-          <a:ext cx="0" cy="0"/>
-          <a:chOff x="0" y="0"/>
-          <a:chExt cx="0" cy="0"/>
-        </a:xfrm>
-      </p:grpSpPr>
-      <p:pic>
-        <p:nvPicPr>
-          <p:cNvPr id="1080" name="Picture 56" descr="C:\Users\Tom\AppData\Local\Microsoft\Windows\Temporary Internet Files\Content.IE5\KVSBUKP6\MPj04386510000[1].jpg"/>
-          <p:cNvPicPr>
-            <a:picLocks noChangeAspect="1" noChangeArrowheads="1"/>
-          </p:cNvPicPr>
-          <p:nvPr/>
-        </p:nvPicPr>
-        <p:blipFill>
-          <a:blip r:embed="rId2" cstate="print"/>
-          <a:srcRect/>
-          <a:stretch>
-            <a:fillRect/>
-          </a:stretch>
-        </p:blipFill>
-        <p:spPr bwMode="auto">
-          <a:xfrm>
-            <a:off x="0" y="-17532"/>
-            <a:ext cx="9144000" cy="6858000"/>
-          </a:xfrm>
-          <a:prstGeom prst="rect">
-            <a:avLst/>
-          </a:prstGeom>
-          <a:noFill/>
-        </p:spPr>
-      </p:pic>
-      <p:sp>
-        <p:nvSpPr>
-          <p:cNvPr id="2" name="Titre 1"/>
-          <p:cNvSpPr>
-            <a:spLocks noGrp="1"/>
-          </p:cNvSpPr>
-          <p:nvPr>
-            <p:ph type="title"/>
-          </p:nvPr>
-        </p:nvSpPr>
-        <p:spPr/>
-        <p:txBody>
-          <a:bodyPr/>
-          <a:lstStyle/>
-          <a:p>
-            <a:r>
-              <a:rPr lang="fr-FR" dirty="0">
-                <a:solidFill>
-                  <a:srgbClr val="FF0000"/>
-                </a:solidFill>
-                <a:latin typeface="Algerian" panose="04020705040A02060702" pitchFamily="82" charset="0"/>
-              </a:rPr>
-              <a:t>Partie Nino</a:t>
-            </a:r>
-          </a:p>
-        </p:txBody>
-      </p:sp>
-      <p:sp>
-        <p:nvSpPr>
-          <p:cNvPr id="3" name="Sous-titre 2"/>
-          <p:cNvSpPr>
-            <a:spLocks noGrp="1"/>
-          </p:cNvSpPr>
-          <p:nvPr>
-            <p:ph idx="1"/>
-          </p:nvPr>
-        </p:nvSpPr>
-        <p:spPr/>
-        <p:txBody>
-          <a:bodyPr/>
-          <a:lstStyle/>
-          <a:p>
-            <a:r>
-              <a:rPr lang="fr-FR" dirty="0">
-                <a:solidFill>
-                  <a:srgbClr val="FF0000"/>
-                </a:solidFill>
-                <a:latin typeface="Algerian" panose="04020705040A02060702" pitchFamily="82" charset="0"/>
-              </a:rPr>
-              <a:t>Présentation</a:t>
-            </a:r>
-          </a:p>
-        </p:txBody>
-      </p:sp>
-    </p:spTree>
-    <p:extLst>
-      <p:ext uri="{BB962C8B-B14F-4D97-AF65-F5344CB8AC3E}">
-        <p14:creationId xmlns:p14="http://schemas.microsoft.com/office/powerpoint/2010/main" val="2451872810"/>
-      </p:ext>
-    </p:extLst>
-  </p:cSld>
-  <p:clrMapOvr>
-    <a:masterClrMapping/>
-  </p:clrMapOvr>
-</p:sld>
-</file>
-
-<file path=ppt/slides/slide4.xml><?xml version="1.0" encoding="utf-8"?>
-<p:sld xmlns:a="http://schemas.openxmlformats.org/drawingml/2006/main" xmlns:r="http://schemas.openxmlformats.org/officeDocument/2006/relationships" xmlns:p="http://schemas.openxmlformats.org/presentationml/2006/main">
-  <p:cSld>
-    <p:spTree>
-      <p:nvGrpSpPr>
-        <p:cNvPr id="1" name=""/>
-        <p:cNvGrpSpPr/>
-        <p:nvPr/>
-      </p:nvGrpSpPr>
-      <p:grpSpPr>
-        <a:xfrm>
-          <a:off x="0" y="0"/>
-          <a:ext cx="0" cy="0"/>
-          <a:chOff x="0" y="0"/>
-          <a:chExt cx="0" cy="0"/>
-        </a:xfrm>
-      </p:grpSpPr>
-      <p:pic>
-        <p:nvPicPr>
-          <p:cNvPr id="1080" name="Picture 56" descr="C:\Users\Tom\AppData\Local\Microsoft\Windows\Temporary Internet Files\Content.IE5\KVSBUKP6\MPj04386510000[1].jpg"/>
-          <p:cNvPicPr>
-            <a:picLocks noChangeAspect="1" noChangeArrowheads="1"/>
-          </p:cNvPicPr>
-          <p:nvPr/>
-        </p:nvPicPr>
-        <p:blipFill>
-          <a:blip r:embed="rId2" cstate="print"/>
-          <a:srcRect/>
-          <a:stretch>
-            <a:fillRect/>
-          </a:stretch>
-        </p:blipFill>
-        <p:spPr bwMode="auto">
-          <a:xfrm>
-            <a:off x="0" y="0"/>
-            <a:ext cx="9144000" cy="6858000"/>
-          </a:xfrm>
-          <a:prstGeom prst="rect">
-            <a:avLst/>
-          </a:prstGeom>
-          <a:noFill/>
-        </p:spPr>
-      </p:pic>
-      <p:sp>
-        <p:nvSpPr>
-          <p:cNvPr id="2" name="Titre 1"/>
-          <p:cNvSpPr>
-            <a:spLocks noGrp="1"/>
-          </p:cNvSpPr>
-          <p:nvPr>
-            <p:ph type="title"/>
-          </p:nvPr>
-        </p:nvSpPr>
-        <p:spPr/>
-        <p:txBody>
-          <a:bodyPr/>
-          <a:lstStyle/>
-          <a:p>
-            <a:r>
-              <a:rPr lang="fr-FR" dirty="0">
-                <a:solidFill>
-                  <a:srgbClr val="FF0000"/>
+                  <a:srgbClr val="000000"/>
                 </a:solidFill>
                 <a:latin typeface="Algerian" panose="04020705040A02060702" pitchFamily="82" charset="0"/>
               </a:rPr>
@@ -3448,15 +4072,25 @@
             <p:ph idx="1"/>
           </p:nvPr>
         </p:nvSpPr>
-        <p:spPr/>
-        <p:txBody>
-          <a:bodyPr/>
+        <p:spPr>
+          <a:xfrm>
+            <a:off x="603519" y="190527"/>
+            <a:ext cx="3530103" cy="3788830"/>
+          </a:xfrm>
+        </p:spPr>
+        <p:txBody>
+          <a:bodyPr anchor="ctr">
+            <a:normAutofit/>
+          </a:bodyPr>
           <a:lstStyle/>
           <a:p>
-            <a:r>
-              <a:rPr lang="fr-FR" dirty="0">
+            <a:pPr marL="0" indent="0">
+              <a:buNone/>
+            </a:pPr>
+            <a:r>
+              <a:rPr lang="fr-FR" sz="1700" dirty="0">
                 <a:solidFill>
-                  <a:srgbClr val="FF0000"/>
+                  <a:srgbClr val="000000"/>
                 </a:solidFill>
                 <a:latin typeface="Algerian" panose="04020705040A02060702" pitchFamily="82" charset="0"/>
               </a:rPr>
@@ -3481,6 +4115,14 @@
 <file path=ppt/slides/slide5.xml><?xml version="1.0" encoding="utf-8"?>
 <p:sld xmlns:a="http://schemas.openxmlformats.org/drawingml/2006/main" xmlns:r="http://schemas.openxmlformats.org/officeDocument/2006/relationships" xmlns:p="http://schemas.openxmlformats.org/presentationml/2006/main">
   <p:cSld>
+    <p:bg>
+      <p:bgPr>
+        <a:solidFill>
+          <a:schemeClr val="bg1"/>
+        </a:solidFill>
+        <a:effectLst/>
+      </p:bgPr>
+    </p:bg>
     <p:spTree>
       <p:nvGrpSpPr>
         <p:cNvPr id="1" name=""/>
@@ -3495,6 +4137,69 @@
           <a:chExt cx="0" cy="0"/>
         </a:xfrm>
       </p:grpSpPr>
+      <p:sp>
+        <p:nvSpPr>
+          <p:cNvPr id="125" name="Rectangle 124">
+            <a:extLst>
+              <a:ext uri="{FF2B5EF4-FFF2-40B4-BE49-F238E27FC236}">
+                <a16:creationId xmlns:a16="http://schemas.microsoft.com/office/drawing/2014/main" id="{2A0E4E09-FC02-4ADC-951A-3FFA90B6FE39}"/>
+              </a:ext>
+              <a:ext uri="{C183D7F6-B498-43B3-948B-1728B52AA6E4}">
+                <adec:decorative xmlns:adec="http://schemas.microsoft.com/office/drawing/2017/decorative" val="1"/>
+              </a:ext>
+            </a:extLst>
+          </p:cNvPr>
+          <p:cNvSpPr>
+            <a:spLocks noGrp="1" noRot="1" noChangeAspect="1" noMove="1" noResize="1" noEditPoints="1" noAdjustHandles="1" noChangeArrowheads="1" noChangeShapeType="1" noTextEdit="1"/>
+          </p:cNvSpPr>
+          <p:nvPr>
+            <p:extLst>
+              <p:ext uri="{386F3935-93C4-4BCD-93E2-E3B085C9AB24}">
+                <p16:designElem xmlns:p16="http://schemas.microsoft.com/office/powerpoint/2015/main" val="1"/>
+              </p:ext>
+            </p:extLst>
+          </p:nvPr>
+        </p:nvSpPr>
+        <p:spPr>
+          <a:xfrm>
+            <a:off x="0" y="0"/>
+            <a:ext cx="9143771" cy="6858000"/>
+          </a:xfrm>
+          <a:prstGeom prst="rect">
+            <a:avLst/>
+          </a:prstGeom>
+          <a:solidFill>
+            <a:schemeClr val="bg1"/>
+          </a:solidFill>
+          <a:ln>
+            <a:noFill/>
+          </a:ln>
+        </p:spPr>
+        <p:style>
+          <a:lnRef idx="2">
+            <a:schemeClr val="accent1">
+              <a:shade val="50000"/>
+            </a:schemeClr>
+          </a:lnRef>
+          <a:fillRef idx="1">
+            <a:schemeClr val="accent1"/>
+          </a:fillRef>
+          <a:effectRef idx="0">
+            <a:schemeClr val="accent1"/>
+          </a:effectRef>
+          <a:fontRef idx="minor">
+            <a:schemeClr val="lt1"/>
+          </a:fontRef>
+        </p:style>
+        <p:txBody>
+          <a:bodyPr rtlCol="0" anchor="ctr"/>
+          <a:lstStyle/>
+          <a:p>
+            <a:pPr algn="ctr"/>
+            <a:endParaRPr lang="en-US"/>
+          </a:p>
+        </p:txBody>
+      </p:sp>
       <p:pic>
         <p:nvPicPr>
           <p:cNvPr id="1080" name="Picture 56" descr="C:\Users\Tom\AppData\Local\Microsoft\Windows\Temporary Internet Files\Content.IE5\KVSBUKP6\MPj04386510000[1].jpg"/>
@@ -3503,14 +4208,60 @@
           </p:cNvPicPr>
           <p:nvPr/>
         </p:nvPicPr>
+        <p:blipFill rotWithShape="1">
+          <a:blip r:embed="rId2" cstate="print">
+            <a:alphaModFix/>
+          </a:blip>
+          <a:srcRect r="364"/>
+          <a:stretch/>
+        </p:blipFill>
+        <p:spPr bwMode="auto">
+          <a:xfrm>
+            <a:off x="-228" y="-1"/>
+            <a:ext cx="4817289" cy="6858001"/>
+          </a:xfrm>
+          <a:prstGeom prst="rect">
+            <a:avLst/>
+          </a:prstGeom>
+          <a:noFill/>
+        </p:spPr>
+      </p:pic>
+      <p:pic>
+        <p:nvPicPr>
+          <p:cNvPr id="127" name="Picture 126">
+            <a:extLst>
+              <a:ext uri="{FF2B5EF4-FFF2-40B4-BE49-F238E27FC236}">
+                <a16:creationId xmlns:a16="http://schemas.microsoft.com/office/drawing/2014/main" id="{24F266AD-725B-4A9D-B448-4C000F95CB47}"/>
+              </a:ext>
+              <a:ext uri="{C183D7F6-B498-43B3-948B-1728B52AA6E4}">
+                <adec:decorative xmlns:adec="http://schemas.microsoft.com/office/drawing/2017/decorative" val="1"/>
+              </a:ext>
+            </a:extLst>
+          </p:cNvPr>
+          <p:cNvPicPr>
+            <a:picLocks noGrp="1" noRot="1" noChangeAspect="1" noMove="1" noResize="1" noEditPoints="1" noAdjustHandles="1" noChangeArrowheads="1" noChangeShapeType="1" noCrop="1"/>
+          </p:cNvPicPr>
+          <p:nvPr>
+            <p:extLst>
+              <p:ext uri="{386F3935-93C4-4BCD-93E2-E3B085C9AB24}">
+                <p16:designElem xmlns:p16="http://schemas.microsoft.com/office/powerpoint/2015/main" val="1"/>
+              </p:ext>
+            </p:extLst>
+          </p:nvPr>
+        </p:nvPicPr>
         <p:blipFill>
-          <a:blip r:embed="rId2" cstate="print"/>
-          <a:srcRect/>
+          <a:blip r:embed="rId3">
+            <a:extLst>
+              <a:ext uri="{28A0092B-C50C-407E-A947-70E740481C1C}">
+                <a14:useLocalDpi xmlns:a14="http://schemas.microsoft.com/office/drawing/2010/main" val="0"/>
+              </a:ext>
+            </a:extLst>
+          </a:blip>
           <a:stretch>
             <a:fillRect/>
           </a:stretch>
         </p:blipFill>
-        <p:spPr bwMode="auto">
+        <p:spPr>
           <a:xfrm>
             <a:off x="0" y="0"/>
             <a:ext cx="9144000" cy="6858000"/>
@@ -3518,7 +4269,6 @@
           <a:prstGeom prst="rect">
             <a:avLst/>
           </a:prstGeom>
-          <a:noFill/>
         </p:spPr>
       </p:pic>
       <p:sp>
@@ -3531,59 +4281,70 @@
             <p:ph type="title"/>
           </p:nvPr>
         </p:nvSpPr>
-        <p:spPr/>
-        <p:txBody>
-          <a:bodyPr/>
+        <p:spPr>
+          <a:xfrm>
+            <a:off x="5061204" y="3992591"/>
+            <a:ext cx="3600195" cy="1644592"/>
+          </a:xfrm>
+        </p:spPr>
+        <p:txBody>
+          <a:bodyPr vert="horz" lIns="91440" tIns="45720" rIns="91440" bIns="45720" rtlCol="0" anchor="t">
+            <a:normAutofit/>
+          </a:bodyPr>
           <a:lstStyle/>
           <a:p>
-            <a:r>
-              <a:rPr lang="fr-FR" dirty="0">
+            <a:pPr algn="l">
+              <a:lnSpc>
+                <a:spcPct val="90000"/>
+              </a:lnSpc>
+            </a:pPr>
+            <a:r>
+              <a:rPr lang="en-US" sz="3800">
                 <a:solidFill>
-                  <a:srgbClr val="FF0000"/>
+                  <a:srgbClr val="000000"/>
                 </a:solidFill>
-                <a:latin typeface="Algerian" panose="04020705040A02060702" pitchFamily="82" charset="0"/>
               </a:rPr>
-              <a:t>Partie Lucas/</a:t>
-            </a:r>
-            <a:r>
-              <a:rPr lang="fr-FR" dirty="0" err="1">
+              <a:t>Partie Lucas/maël</a:t>
+            </a:r>
+          </a:p>
+        </p:txBody>
+      </p:sp>
+      <p:sp>
+        <p:nvSpPr>
+          <p:cNvPr id="3" name="Sous-titre 2"/>
+          <p:cNvSpPr>
+            <a:spLocks noGrp="1"/>
+          </p:cNvSpPr>
+          <p:nvPr>
+            <p:ph idx="1"/>
+          </p:nvPr>
+        </p:nvSpPr>
+        <p:spPr>
+          <a:xfrm>
+            <a:off x="5061204" y="3153758"/>
+            <a:ext cx="3533808" cy="838831"/>
+          </a:xfrm>
+        </p:spPr>
+        <p:txBody>
+          <a:bodyPr vert="horz" lIns="91440" tIns="45720" rIns="91440" bIns="45720" rtlCol="0" anchor="b">
+            <a:normAutofit/>
+          </a:bodyPr>
+          <a:lstStyle/>
+          <a:p>
+            <a:pPr marL="0" indent="0">
+              <a:lnSpc>
+                <a:spcPct val="90000"/>
+              </a:lnSpc>
+              <a:spcBef>
+                <a:spcPts val="1000"/>
+              </a:spcBef>
+              <a:buNone/>
+            </a:pPr>
+            <a:r>
+              <a:rPr lang="en-US" sz="1600">
                 <a:solidFill>
-                  <a:srgbClr val="FF0000"/>
+                  <a:srgbClr val="000000"/>
                 </a:solidFill>
-                <a:latin typeface="Algerian" panose="04020705040A02060702" pitchFamily="82" charset="0"/>
-              </a:rPr>
-              <a:t>maël</a:t>
-            </a:r>
-            <a:endParaRPr lang="fr-FR" dirty="0">
-              <a:solidFill>
-                <a:srgbClr val="FF0000"/>
-              </a:solidFill>
-              <a:latin typeface="Algerian" panose="04020705040A02060702" pitchFamily="82" charset="0"/>
-            </a:endParaRPr>
-          </a:p>
-        </p:txBody>
-      </p:sp>
-      <p:sp>
-        <p:nvSpPr>
-          <p:cNvPr id="3" name="Sous-titre 2"/>
-          <p:cNvSpPr>
-            <a:spLocks noGrp="1"/>
-          </p:cNvSpPr>
-          <p:nvPr>
-            <p:ph idx="1"/>
-          </p:nvPr>
-        </p:nvSpPr>
-        <p:spPr/>
-        <p:txBody>
-          <a:bodyPr/>
-          <a:lstStyle/>
-          <a:p>
-            <a:r>
-              <a:rPr lang="fr-FR" dirty="0">
-                <a:solidFill>
-                  <a:srgbClr val="FF0000"/>
-                </a:solidFill>
-                <a:latin typeface="Algerian" panose="04020705040A02060702" pitchFamily="82" charset="0"/>
               </a:rPr>
               <a:t>Technique</a:t>
             </a:r>
@@ -3606,6 +4367,14 @@
 <file path=ppt/slides/slide6.xml><?xml version="1.0" encoding="utf-8"?>
 <p:sld xmlns:a="http://schemas.openxmlformats.org/drawingml/2006/main" xmlns:r="http://schemas.openxmlformats.org/officeDocument/2006/relationships" xmlns:p="http://schemas.openxmlformats.org/presentationml/2006/main">
   <p:cSld>
+    <p:bg>
+      <p:bgPr>
+        <a:solidFill>
+          <a:schemeClr val="bg1"/>
+        </a:solidFill>
+        <a:effectLst/>
+      </p:bgPr>
+    </p:bg>
     <p:spTree>
       <p:nvGrpSpPr>
         <p:cNvPr id="1" name=""/>
@@ -3620,6 +4389,72 @@
           <a:chExt cx="0" cy="0"/>
         </a:xfrm>
       </p:grpSpPr>
+      <p:sp>
+        <p:nvSpPr>
+          <p:cNvPr id="125" name="Rectangle 124">
+            <a:extLst>
+              <a:ext uri="{FF2B5EF4-FFF2-40B4-BE49-F238E27FC236}">
+                <a16:creationId xmlns:a16="http://schemas.microsoft.com/office/drawing/2014/main" id="{75F4D120-3921-42A8-A063-46B023CB0CDA}"/>
+              </a:ext>
+              <a:ext uri="{C183D7F6-B498-43B3-948B-1728B52AA6E4}">
+                <adec:decorative xmlns:adec="http://schemas.microsoft.com/office/drawing/2017/decorative" val="1"/>
+              </a:ext>
+            </a:extLst>
+          </p:cNvPr>
+          <p:cNvSpPr>
+            <a:spLocks noGrp="1" noRot="1" noChangeAspect="1" noMove="1" noResize="1" noEditPoints="1" noAdjustHandles="1" noChangeArrowheads="1" noChangeShapeType="1" noTextEdit="1"/>
+          </p:cNvSpPr>
+          <p:nvPr>
+            <p:extLst>
+              <p:ext uri="{386F3935-93C4-4BCD-93E2-E3B085C9AB24}">
+                <p16:designElem xmlns:p16="http://schemas.microsoft.com/office/powerpoint/2015/main" val="1"/>
+              </p:ext>
+            </p:extLst>
+          </p:nvPr>
+        </p:nvSpPr>
+        <p:spPr>
+          <a:xfrm>
+            <a:off x="0" y="0"/>
+            <a:ext cx="9144000" cy="6858000"/>
+          </a:xfrm>
+          <a:prstGeom prst="rect">
+            <a:avLst/>
+          </a:prstGeom>
+          <a:solidFill>
+            <a:srgbClr val="FFFFFF"/>
+          </a:solidFill>
+          <a:ln w="12700" cap="flat" cmpd="sng" algn="ctr">
+            <a:noFill/>
+            <a:prstDash val="solid"/>
+            <a:miter lim="800000"/>
+          </a:ln>
+          <a:effectLst/>
+        </p:spPr>
+        <p:style>
+          <a:lnRef idx="2">
+            <a:schemeClr val="accent1">
+              <a:shade val="50000"/>
+            </a:schemeClr>
+          </a:lnRef>
+          <a:fillRef idx="1">
+            <a:schemeClr val="accent1"/>
+          </a:fillRef>
+          <a:effectRef idx="0">
+            <a:schemeClr val="accent1"/>
+          </a:effectRef>
+          <a:fontRef idx="minor">
+            <a:schemeClr val="lt1"/>
+          </a:fontRef>
+        </p:style>
+        <p:txBody>
+          <a:bodyPr rtlCol="0" anchor="ctr"/>
+          <a:lstStyle/>
+          <a:p>
+            <a:pPr algn="ctr"/>
+            <a:endParaRPr lang="en-US"/>
+          </a:p>
+        </p:txBody>
+      </p:sp>
       <p:pic>
         <p:nvPicPr>
           <p:cNvPr id="1080" name="Picture 56" descr="C:\Users\Tom\AppData\Local\Microsoft\Windows\Temporary Internet Files\Content.IE5\KVSBUKP6\MPj04386510000[1].jpg"/>
@@ -3628,17 +4463,15 @@
           </p:cNvPicPr>
           <p:nvPr/>
         </p:nvPicPr>
-        <p:blipFill>
+        <p:blipFill rotWithShape="1">
           <a:blip r:embed="rId2" cstate="print"/>
-          <a:srcRect/>
-          <a:stretch>
-            <a:fillRect/>
-          </a:stretch>
+          <a:srcRect t="12799" r="-2" b="18263"/>
+          <a:stretch/>
         </p:blipFill>
         <p:spPr bwMode="auto">
           <a:xfrm>
-            <a:off x="0" y="0"/>
-            <a:ext cx="9144000" cy="6858000"/>
+            <a:off x="3357230" y="595421"/>
+            <a:ext cx="5786770" cy="5658438"/>
           </a:xfrm>
           <a:prstGeom prst="rect">
             <a:avLst/>
@@ -3646,6 +4479,95 @@
           <a:noFill/>
         </p:spPr>
       </p:pic>
+      <p:pic>
+        <p:nvPicPr>
+          <p:cNvPr id="127" name="Picture 126">
+            <a:extLst>
+              <a:ext uri="{FF2B5EF4-FFF2-40B4-BE49-F238E27FC236}">
+                <a16:creationId xmlns:a16="http://schemas.microsoft.com/office/drawing/2014/main" id="{9D01B3E5-85F4-41A9-A504-D5E6268DEC1D}"/>
+              </a:ext>
+              <a:ext uri="{C183D7F6-B498-43B3-948B-1728B52AA6E4}">
+                <adec:decorative xmlns:adec="http://schemas.microsoft.com/office/drawing/2017/decorative" val="1"/>
+              </a:ext>
+            </a:extLst>
+          </p:cNvPr>
+          <p:cNvPicPr>
+            <a:picLocks noGrp="1" noRot="1" noChangeAspect="1" noMove="1" noResize="1" noEditPoints="1" noAdjustHandles="1" noChangeArrowheads="1" noChangeShapeType="1" noCrop="1"/>
+          </p:cNvPicPr>
+          <p:nvPr>
+            <p:extLst>
+              <p:ext uri="{386F3935-93C4-4BCD-93E2-E3B085C9AB24}">
+                <p16:designElem xmlns:p16="http://schemas.microsoft.com/office/powerpoint/2015/main" val="1"/>
+              </p:ext>
+            </p:extLst>
+          </p:nvPr>
+        </p:nvPicPr>
+        <p:blipFill>
+          <a:blip r:embed="rId3">
+            <a:extLst>
+              <a:ext uri="{28A0092B-C50C-407E-A947-70E740481C1C}">
+                <a14:useLocalDpi xmlns:a14="http://schemas.microsoft.com/office/drawing/2010/main" val="0"/>
+              </a:ext>
+            </a:extLst>
+          </a:blip>
+          <a:srcRect r="14729"/>
+          <a:stretch>
+            <a:fillRect/>
+          </a:stretch>
+        </p:blipFill>
+        <p:spPr>
+          <a:xfrm>
+            <a:off x="2599660" y="550975"/>
+            <a:ext cx="6544340" cy="5756049"/>
+          </a:xfrm>
+          <a:custGeom>
+            <a:avLst/>
+            <a:gdLst>
+              <a:gd name="connsiteX0" fmla="*/ 0 w 8725786"/>
+              <a:gd name="connsiteY0" fmla="*/ 0 h 5756049"/>
+              <a:gd name="connsiteX1" fmla="*/ 8725786 w 8725786"/>
+              <a:gd name="connsiteY1" fmla="*/ 0 h 5756049"/>
+              <a:gd name="connsiteX2" fmla="*/ 8725786 w 8725786"/>
+              <a:gd name="connsiteY2" fmla="*/ 5756049 h 5756049"/>
+              <a:gd name="connsiteX3" fmla="*/ 0 w 8725786"/>
+              <a:gd name="connsiteY3" fmla="*/ 5756049 h 5756049"/>
+            </a:gdLst>
+            <a:ahLst/>
+            <a:cxnLst>
+              <a:cxn ang="0">
+                <a:pos x="connsiteX0" y="connsiteY0"/>
+              </a:cxn>
+              <a:cxn ang="0">
+                <a:pos x="connsiteX1" y="connsiteY1"/>
+              </a:cxn>
+              <a:cxn ang="0">
+                <a:pos x="connsiteX2" y="connsiteY2"/>
+              </a:cxn>
+              <a:cxn ang="0">
+                <a:pos x="connsiteX3" y="connsiteY3"/>
+              </a:cxn>
+            </a:cxnLst>
+            <a:rect l="l" t="t" r="r" b="b"/>
+            <a:pathLst>
+              <a:path w="8725786" h="5756049">
+                <a:moveTo>
+                  <a:pt x="0" y="0"/>
+                </a:moveTo>
+                <a:lnTo>
+                  <a:pt x="8725786" y="0"/>
+                </a:lnTo>
+                <a:lnTo>
+                  <a:pt x="8725786" y="5756049"/>
+                </a:lnTo>
+                <a:lnTo>
+                  <a:pt x="0" y="5756049"/>
+                </a:lnTo>
+                <a:close/>
+              </a:path>
+            </a:pathLst>
+          </a:custGeom>
+        </p:spPr>
+      </p:pic>
       <p:sp>
         <p:nvSpPr>
           <p:cNvPr id="2" name="Titre 1"/>
@@ -3656,17 +4578,28 @@
             <p:ph type="title"/>
           </p:nvPr>
         </p:nvSpPr>
-        <p:spPr/>
-        <p:txBody>
-          <a:bodyPr/>
+        <p:spPr>
+          <a:xfrm>
+            <a:off x="603363" y="2546823"/>
+            <a:ext cx="2961201" cy="2383844"/>
+          </a:xfrm>
+        </p:spPr>
+        <p:txBody>
+          <a:bodyPr vert="horz" lIns="91440" tIns="45720" rIns="91440" bIns="45720" rtlCol="0" anchor="t">
+            <a:normAutofit/>
+          </a:bodyPr>
           <a:lstStyle/>
           <a:p>
-            <a:r>
-              <a:rPr lang="fr-FR" dirty="0">
+            <a:pPr algn="l">
+              <a:lnSpc>
+                <a:spcPct val="90000"/>
+              </a:lnSpc>
+            </a:pPr>
+            <a:r>
+              <a:rPr lang="en-US" sz="3800">
                 <a:solidFill>
-                  <a:srgbClr val="FF0000"/>
+                  <a:srgbClr val="000000"/>
                 </a:solidFill>
-                <a:latin typeface="Algerian" panose="04020705040A02060702" pitchFamily="82" charset="0"/>
               </a:rPr>
               <a:t>Partie Rémi</a:t>
             </a:r>
@@ -3683,26 +4616,35 @@
             <p:ph idx="1"/>
           </p:nvPr>
         </p:nvSpPr>
-        <p:spPr/>
-        <p:txBody>
-          <a:bodyPr/>
+        <p:spPr>
+          <a:xfrm>
+            <a:off x="603591" y="1485718"/>
+            <a:ext cx="2809460" cy="1061105"/>
+          </a:xfrm>
+        </p:spPr>
+        <p:txBody>
+          <a:bodyPr vert="horz" lIns="91440" tIns="45720" rIns="91440" bIns="45720" rtlCol="0" anchor="b">
+            <a:normAutofit/>
+          </a:bodyPr>
           <a:lstStyle/>
           <a:p>
-            <a:r>
-              <a:rPr lang="fr-FR">
+            <a:pPr marL="0" indent="0">
+              <a:lnSpc>
+                <a:spcPct val="90000"/>
+              </a:lnSpc>
+              <a:spcBef>
+                <a:spcPts val="1000"/>
+              </a:spcBef>
+              <a:buNone/>
+            </a:pPr>
+            <a:r>
+              <a:rPr lang="en-US" sz="1600">
                 <a:solidFill>
-                  <a:srgbClr val="FF0000"/>
+                  <a:srgbClr val="000000"/>
                 </a:solidFill>
-                <a:latin typeface="Algerian" panose="04020705040A02060702" pitchFamily="82" charset="0"/>
               </a:rPr>
               <a:t>Conclusion</a:t>
             </a:r>
-            <a:endParaRPr lang="fr-FR" dirty="0">
-              <a:solidFill>
-                <a:srgbClr val="FF0000"/>
-              </a:solidFill>
-              <a:latin typeface="Algerian" panose="04020705040A02060702" pitchFamily="82" charset="0"/>
-            </a:endParaRPr>
           </a:p>
         </p:txBody>
       </p:sp>
@@ -3710,116 +4652,6 @@
     <p:extLst>
       <p:ext uri="{BB962C8B-B14F-4D97-AF65-F5344CB8AC3E}">
         <p14:creationId xmlns:p14="http://schemas.microsoft.com/office/powerpoint/2010/main" val="1296773572"/>
-      </p:ext>
-    </p:extLst>
-  </p:cSld>
-  <p:clrMapOvr>
-    <a:masterClrMapping/>
-  </p:clrMapOvr>
-</p:sld>
-</file>
-
-<file path=ppt/slides/slide7.xml><?xml version="1.0" encoding="utf-8"?>
-<p:sld xmlns:a="http://schemas.openxmlformats.org/drawingml/2006/main" xmlns:r="http://schemas.openxmlformats.org/officeDocument/2006/relationships" xmlns:p="http://schemas.openxmlformats.org/presentationml/2006/main">
-  <p:cSld>
-    <p:spTree>
-      <p:nvGrpSpPr>
-        <p:cNvPr id="1" name=""/>
-        <p:cNvGrpSpPr/>
-        <p:nvPr/>
-      </p:nvGrpSpPr>
-      <p:grpSpPr>
-        <a:xfrm>
-          <a:off x="0" y="0"/>
-          <a:ext cx="0" cy="0"/>
-          <a:chOff x="0" y="0"/>
-          <a:chExt cx="0" cy="0"/>
-        </a:xfrm>
-      </p:grpSpPr>
-      <p:pic>
-        <p:nvPicPr>
-          <p:cNvPr id="1080" name="Picture 56" descr="C:\Users\Tom\AppData\Local\Microsoft\Windows\Temporary Internet Files\Content.IE5\KVSBUKP6\MPj04386510000[1].jpg"/>
-          <p:cNvPicPr>
-            <a:picLocks noChangeAspect="1" noChangeArrowheads="1"/>
-          </p:cNvPicPr>
-          <p:nvPr/>
-        </p:nvPicPr>
-        <p:blipFill>
-          <a:blip r:embed="rId2" cstate="print"/>
-          <a:srcRect/>
-          <a:stretch>
-            <a:fillRect/>
-          </a:stretch>
-        </p:blipFill>
-        <p:spPr bwMode="auto">
-          <a:xfrm>
-            <a:off x="0" y="0"/>
-            <a:ext cx="9144000" cy="6858000"/>
-          </a:xfrm>
-          <a:prstGeom prst="rect">
-            <a:avLst/>
-          </a:prstGeom>
-          <a:noFill/>
-        </p:spPr>
-      </p:pic>
-      <p:sp>
-        <p:nvSpPr>
-          <p:cNvPr id="2" name="Titre 1"/>
-          <p:cNvSpPr>
-            <a:spLocks noGrp="1"/>
-          </p:cNvSpPr>
-          <p:nvPr>
-            <p:ph type="title"/>
-          </p:nvPr>
-        </p:nvSpPr>
-        <p:spPr/>
-        <p:txBody>
-          <a:bodyPr/>
-          <a:lstStyle/>
-          <a:p>
-            <a:r>
-              <a:rPr lang="fr-FR" dirty="0">
-                <a:solidFill>
-                  <a:srgbClr val="FF0000"/>
-                </a:solidFill>
-                <a:latin typeface="Algerian" panose="04020705040A02060702" pitchFamily="82" charset="0"/>
-              </a:rPr>
-              <a:t>Partie Nino</a:t>
-            </a:r>
-          </a:p>
-        </p:txBody>
-      </p:sp>
-      <p:sp>
-        <p:nvSpPr>
-          <p:cNvPr id="3" name="Sous-titre 2"/>
-          <p:cNvSpPr>
-            <a:spLocks noGrp="1"/>
-          </p:cNvSpPr>
-          <p:nvPr>
-            <p:ph idx="1"/>
-          </p:nvPr>
-        </p:nvSpPr>
-        <p:spPr/>
-        <p:txBody>
-          <a:bodyPr/>
-          <a:lstStyle/>
-          <a:p>
-            <a:r>
-              <a:rPr lang="fr-FR" dirty="0">
-                <a:solidFill>
-                  <a:srgbClr val="FF0000"/>
-                </a:solidFill>
-                <a:latin typeface="Algerian" panose="04020705040A02060702" pitchFamily="82" charset="0"/>
-              </a:rPr>
-              <a:t>Introduction</a:t>
-            </a:r>
-          </a:p>
-        </p:txBody>
-      </p:sp>
-    </p:spTree>
-    <p:extLst>
-      <p:ext uri="{BB962C8B-B14F-4D97-AF65-F5344CB8AC3E}">
-        <p14:creationId xmlns:p14="http://schemas.microsoft.com/office/powerpoint/2010/main" val="2544039012"/>
       </p:ext>
     </p:extLst>
   </p:cSld>
@@ -4113,6 +4945,147 @@
 </file>
 
 <file path=customXml/item1.xml><?xml version="1.0" encoding="utf-8"?>
+<p:properties xmlns:p="http://schemas.microsoft.com/office/2006/metadata/properties" xmlns:xsi="http://www.w3.org/2001/XMLSchema-instance" xmlns:pc="http://schemas.microsoft.com/office/infopath/2007/PartnerControls">
+  <documentManagement>
+    <AcquiredFrom xmlns="6d93d202-47fc-4405-873a-cab67cc5f1b2" xsi:nil="true"/>
+    <IsSearchable xmlns="6d93d202-47fc-4405-873a-cab67cc5f1b2">true</IsSearchable>
+    <EditorialStatus xmlns="6d93d202-47fc-4405-873a-cab67cc5f1b2">Complete</EditorialStatus>
+    <OriginAsset xmlns="6d93d202-47fc-4405-873a-cab67cc5f1b2" xsi:nil="true"/>
+    <ThumbnailAssetId xmlns="6d93d202-47fc-4405-873a-cab67cc5f1b2" xsi:nil="true"/>
+    <TrustLevel xmlns="6d93d202-47fc-4405-873a-cab67cc5f1b2">3 Community New</TrustLevel>
+    <MarketSpecific xmlns="6d93d202-47fc-4405-873a-cab67cc5f1b2">true</MarketSpecific>
+    <TPNamespace xmlns="6d93d202-47fc-4405-873a-cab67cc5f1b2" xsi:nil="true"/>
+    <DirectSourceMarket xmlns="6d93d202-47fc-4405-873a-cab67cc5f1b2">english</DirectSourceMarket>
+    <MachineTranslated xmlns="6d93d202-47fc-4405-873a-cab67cc5f1b2">false</MachineTranslated>
+    <PlannedPubDate xmlns="6d93d202-47fc-4405-873a-cab67cc5f1b2" xsi:nil="true"/>
+    <SubmitterId xmlns="6d93d202-47fc-4405-873a-cab67cc5f1b2">9c60ae39-ee33-43c2-b863-454968d0f2cc</SubmitterId>
+    <Downloads xmlns="6d93d202-47fc-4405-873a-cab67cc5f1b2">0</Downloads>
+    <OriginalSourceMarket xmlns="6d93d202-47fc-4405-873a-cab67cc5f1b2">english</OriginalSourceMarket>
+    <PublishTargets xmlns="6d93d202-47fc-4405-873a-cab67cc5f1b2">OfficeOnline</PublishTargets>
+    <ArtSampleDocs xmlns="6d93d202-47fc-4405-873a-cab67cc5f1b2" xsi:nil="true"/>
+    <ApprovalLog xmlns="6d93d202-47fc-4405-873a-cab67cc5f1b2" xsi:nil="true"/>
+    <ApprovalStatus xmlns="6d93d202-47fc-4405-873a-cab67cc5f1b2">InProgress</ApprovalStatus>
+    <TPComponent xmlns="6d93d202-47fc-4405-873a-cab67cc5f1b2">PPTFiles</TPComponent>
+    <EditorialTags xmlns="6d93d202-47fc-4405-873a-cab67cc5f1b2" xsi:nil="true"/>
+    <TPExecutable xmlns="6d93d202-47fc-4405-873a-cab67cc5f1b2" xsi:nil="true"/>
+    <LastHandOff xmlns="6d93d202-47fc-4405-873a-cab67cc5f1b2" xsi:nil="true"/>
+    <BusinessGroup xmlns="6d93d202-47fc-4405-873a-cab67cc5f1b2" xsi:nil="true"/>
+    <TPAppVersion xmlns="6d93d202-47fc-4405-873a-cab67cc5f1b2">12</TPAppVersion>
+    <VoteCount xmlns="6d93d202-47fc-4405-873a-cab67cc5f1b2" xsi:nil="true"/>
+    <APAuthor xmlns="6d93d202-47fc-4405-873a-cab67cc5f1b2">
+      <UserInfo>
+        <DisplayName>_o14migrate</DisplayName>
+        <AccountId>266</AccountId>
+        <AccountType/>
+      </UserInfo>
+    </APAuthor>
+    <TPCommandLine xmlns="6d93d202-47fc-4405-873a-cab67cc5f1b2">{PP} /n {FilePath}</TPCommandLine>
+    <UACurrentWords xmlns="6d93d202-47fc-4405-873a-cab67cc5f1b2" xsi:nil="true"/>
+    <AssetId xmlns="6d93d202-47fc-4405-873a-cab67cc5f1b2">TP030007338</AssetId>
+    <Manager xmlns="6d93d202-47fc-4405-873a-cab67cc5f1b2" xsi:nil="true"/>
+    <NumericId xmlns="6d93d202-47fc-4405-873a-cab67cc5f1b2">-1</NumericId>
+    <Component xmlns="64acb2c5-0a2b-4bda-bd34-58e36cbb80d2" xsi:nil="true"/>
+    <HandoffToMSDN xmlns="6d93d202-47fc-4405-873a-cab67cc5f1b2" xsi:nil="true"/>
+    <Markets xmlns="6d93d202-47fc-4405-873a-cab67cc5f1b2">
+      <Value>2</Value>
+    </Markets>
+    <UALocComments xmlns="6d93d202-47fc-4405-873a-cab67cc5f1b2" xsi:nil="true"/>
+    <UALocRecommendation xmlns="6d93d202-47fc-4405-873a-cab67cc5f1b2">Localize</UALocRecommendation>
+    <AssetStart xmlns="6d93d202-47fc-4405-873a-cab67cc5f1b2">2010-04-16T14:31:10+00:00</AssetStart>
+    <CrawlForDependencies xmlns="6d93d202-47fc-4405-873a-cab67cc5f1b2">false</CrawlForDependencies>
+    <LastModifiedDateTime xmlns="6d93d202-47fc-4405-873a-cab67cc5f1b2" xsi:nil="true"/>
+    <LastPublishResultLookup xmlns="6d93d202-47fc-4405-873a-cab67cc5f1b2" xsi:nil="true"/>
+    <PublishStatusLookup xmlns="6d93d202-47fc-4405-873a-cab67cc5f1b2">
+      <Value>328776</Value>
+      <Value>502242</Value>
+    </PublishStatusLookup>
+    <AverageRating xmlns="6d93d202-47fc-4405-873a-cab67cc5f1b2" xsi:nil="true"/>
+    <CSXUpdate xmlns="6d93d202-47fc-4405-873a-cab67cc5f1b2">false</CSXUpdate>
+    <UAProjectedTotalWords xmlns="6d93d202-47fc-4405-873a-cab67cc5f1b2" xsi:nil="true"/>
+    <AssetExpire xmlns="6d93d202-47fc-4405-873a-cab67cc5f1b2">2100-01-01T00:00:00+00:00</AssetExpire>
+    <AssetType xmlns="6d93d202-47fc-4405-873a-cab67cc5f1b2">TP</AssetType>
+    <IntlLangReviewDate xmlns="6d93d202-47fc-4405-873a-cab67cc5f1b2" xsi:nil="true"/>
+    <TPFriendlyName xmlns="6d93d202-47fc-4405-873a-cab67cc5f1b2">Thème foot - Stade</TPFriendlyName>
+    <IntlLangReview xmlns="6d93d202-47fc-4405-873a-cab67cc5f1b2" xsi:nil="true"/>
+    <OOCacheId xmlns="6d93d202-47fc-4405-873a-cab67cc5f1b2" xsi:nil="true"/>
+    <PolicheckWords xmlns="6d93d202-47fc-4405-873a-cab67cc5f1b2" xsi:nil="true"/>
+    <TemplateStatus xmlns="6d93d202-47fc-4405-873a-cab67cc5f1b2">Complete</TemplateStatus>
+    <CSXSubmissionMarket xmlns="6d93d202-47fc-4405-873a-cab67cc5f1b2" xsi:nil="true"/>
+    <FriendlyTitle xmlns="6d93d202-47fc-4405-873a-cab67cc5f1b2" xsi:nil="true"/>
+    <TPLaunchHelpLinkType xmlns="6d93d202-47fc-4405-873a-cab67cc5f1b2" xsi:nil="true"/>
+    <Providers xmlns="6d93d202-47fc-4405-873a-cab67cc5f1b2" xsi:nil="true"/>
+    <SourceTitle xmlns="6d93d202-47fc-4405-873a-cab67cc5f1b2">Thème foot - Stade</SourceTitle>
+    <TemplateTemplateType xmlns="6d93d202-47fc-4405-873a-cab67cc5f1b2">PowerPoint 12 Default</TemplateTemplateType>
+    <TimesCloned xmlns="6d93d202-47fc-4405-873a-cab67cc5f1b2" xsi:nil="true"/>
+    <ClipArtFilename xmlns="6d93d202-47fc-4405-873a-cab67cc5f1b2" xsi:nil="true"/>
+    <APDescription xmlns="6d93d202-47fc-4405-873a-cab67cc5f1b2" xsi:nil="true"/>
+    <TPApplication xmlns="6d93d202-47fc-4405-873a-cab67cc5f1b2">PowerPoint</TPApplication>
+    <CSXHash xmlns="6d93d202-47fc-4405-873a-cab67cc5f1b2">vG7ZKCtvohoLZ8n/FgAYq13p/5c=</CSXHash>
+    <PrimaryImageGen xmlns="6d93d202-47fc-4405-873a-cab67cc5f1b2">true</PrimaryImageGen>
+    <ContentItem xmlns="6d93d202-47fc-4405-873a-cab67cc5f1b2" xsi:nil="true"/>
+    <IsDeleted xmlns="6d93d202-47fc-4405-873a-cab67cc5f1b2">false</IsDeleted>
+    <ShowIn xmlns="6d93d202-47fc-4405-873a-cab67cc5f1b2">Show everywhere</ShowIn>
+    <BugNumber xmlns="6d93d202-47fc-4405-873a-cab67cc5f1b2" xsi:nil="true"/>
+    <LegacyData xmlns="6d93d202-47fc-4405-873a-cab67cc5f1b2">ListingID:;Manager:;BuildStatus:Publish Passed;MockupPath:</LegacyData>
+    <TPLaunchHelpLink xmlns="6d93d202-47fc-4405-873a-cab67cc5f1b2" xsi:nil="true"/>
+    <Milestone xmlns="6d93d202-47fc-4405-873a-cab67cc5f1b2" xsi:nil="true"/>
+    <UANotes xmlns="6d93d202-47fc-4405-873a-cab67cc5f1b2" xsi:nil="true"/>
+    <Description0 xmlns="64acb2c5-0a2b-4bda-bd34-58e36cbb80d2" xsi:nil="true"/>
+    <IntlLangReviewer xmlns="6d93d202-47fc-4405-873a-cab67cc5f1b2" xsi:nil="true"/>
+    <IntlLocPriority xmlns="6d93d202-47fc-4405-873a-cab67cc5f1b2" xsi:nil="true"/>
+    <OpenTemplate xmlns="6d93d202-47fc-4405-873a-cab67cc5f1b2">true</OpenTemplate>
+    <Provider xmlns="6d93d202-47fc-4405-873a-cab67cc5f1b2" xsi:nil="true"/>
+    <CSXSubmissionDate xmlns="6d93d202-47fc-4405-873a-cab67cc5f1b2">2009-10-10T07:00:00+00:00</CSXSubmissionDate>
+    <TPClientViewer xmlns="6d93d202-47fc-4405-873a-cab67cc5f1b2" xsi:nil="true"/>
+    <DSATActionTaken xmlns="6d93d202-47fc-4405-873a-cab67cc5f1b2" xsi:nil="true"/>
+    <APEditor xmlns="6d93d202-47fc-4405-873a-cab67cc5f1b2">
+      <UserInfo>
+        <DisplayName>_o14migrate</DisplayName>
+        <AccountId>266</AccountId>
+        <AccountType/>
+      </UserInfo>
+    </APEditor>
+    <TPInstallLocation xmlns="6d93d202-47fc-4405-873a-cab67cc5f1b2">{My Templates}</TPInstallLocation>
+    <OutputCachingOn xmlns="6d93d202-47fc-4405-873a-cab67cc5f1b2">false</OutputCachingOn>
+    <ParentAssetId xmlns="6d93d202-47fc-4405-873a-cab67cc5f1b2" xsi:nil="true"/>
+    <LocManualTestRequired xmlns="6d93d202-47fc-4405-873a-cab67cc5f1b2">false</LocManualTestRequired>
+    <LocalizationTagsTaxHTField0 xmlns="6d93d202-47fc-4405-873a-cab67cc5f1b2">
+      <Terms xmlns="http://schemas.microsoft.com/office/infopath/2007/PartnerControls"/>
+    </LocalizationTagsTaxHTField0>
+    <CampaignTagsTaxHTField0 xmlns="6d93d202-47fc-4405-873a-cab67cc5f1b2">
+      <Terms xmlns="http://schemas.microsoft.com/office/infopath/2007/PartnerControls"/>
+    </CampaignTagsTaxHTField0>
+    <LocLastLocAttemptVersionLookup xmlns="6d93d202-47fc-4405-873a-cab67cc5f1b2">169854</LocLastLocAttemptVersionLookup>
+    <InternalTagsTaxHTField0 xmlns="6d93d202-47fc-4405-873a-cab67cc5f1b2">
+      <Terms xmlns="http://schemas.microsoft.com/office/infopath/2007/PartnerControls"/>
+    </InternalTagsTaxHTField0>
+    <LocRecommendedHandoff xmlns="6d93d202-47fc-4405-873a-cab67cc5f1b2" xsi:nil="true"/>
+    <BlockPublish xmlns="6d93d202-47fc-4405-873a-cab67cc5f1b2">false</BlockPublish>
+    <LocComments xmlns="6d93d202-47fc-4405-873a-cab67cc5f1b2" xsi:nil="true"/>
+    <TaxCatchAll xmlns="6d93d202-47fc-4405-873a-cab67cc5f1b2"/>
+    <OriginalRelease xmlns="6d93d202-47fc-4405-873a-cab67cc5f1b2">14</OriginalRelease>
+    <RecommendationsModifier xmlns="6d93d202-47fc-4405-873a-cab67cc5f1b2" xsi:nil="true"/>
+    <ScenarioTagsTaxHTField0 xmlns="6d93d202-47fc-4405-873a-cab67cc5f1b2">
+      <Terms xmlns="http://schemas.microsoft.com/office/infopath/2007/PartnerControls"/>
+    </ScenarioTagsTaxHTField0>
+    <FeatureTagsTaxHTField0 xmlns="6d93d202-47fc-4405-873a-cab67cc5f1b2">
+      <Terms xmlns="http://schemas.microsoft.com/office/infopath/2007/PartnerControls"/>
+    </FeatureTagsTaxHTField0>
+    <LocMarketGroupTiers2 xmlns="6d93d202-47fc-4405-873a-cab67cc5f1b2" xsi:nil="true"/>
+  </documentManagement>
+</p:properties>
+</file>
+
+<file path=customXml/item2.xml><?xml version="1.0" encoding="utf-8"?>
+<?mso-contentType ?>
+<FormTemplates xmlns="http://schemas.microsoft.com/sharepoint/v3/contenttype/forms">
+  <Display>DocumentLibraryForm</Display>
+  <Edit>AssetEditForm</Edit>
+  <New>DocumentLibraryForm</New>
+</FormTemplates>
+</file>
+
+<file path=customXml/item3.xml><?xml version="1.0" encoding="utf-8"?>
 <ct:contentTypeSchema xmlns:ct="http://schemas.microsoft.com/office/2006/metadata/contentType" xmlns:ma="http://schemas.microsoft.com/office/2006/metadata/properties/metaAttributes" ct:_="" ma:_="" ma:contentTypeName="TemplateFile" ma:contentTypeID="0x01010069924D1ECC420D47A2456556BC94F7370400BDF4491DEA4973499845289601F88B9F" ma:contentTypeVersion="55" ma:contentTypeDescription="Create a new document." ma:contentTypeScope="" ma:versionID="41eb558a2b826e6e4f9defd990175bec">
   <xsd:schema xmlns:xsd="http://www.w3.org/2001/XMLSchema" xmlns:xs="http://www.w3.org/2001/XMLSchema" xmlns:p="http://schemas.microsoft.com/office/2006/metadata/properties" xmlns:ns2="6d93d202-47fc-4405-873a-cab67cc5f1b2" xmlns:ns3="64acb2c5-0a2b-4bda-bd34-58e36cbb80d2" targetNamespace="http://schemas.microsoft.com/office/2006/metadata/properties" ma:root="true" ma:fieldsID="19deea0185cf7bc57eee9b90b1ba2ace" ns2:_="" ns3:_="">
     <xsd:import namespace="6d93d202-47fc-4405-873a-cab67cc5f1b2"/>
@@ -5171,148 +6144,26 @@
 </ct:contentTypeSchema>
 </file>
 
-<file path=customXml/item2.xml><?xml version="1.0" encoding="utf-8"?>
-<?mso-contentType ?>
-<FormTemplates xmlns="http://schemas.microsoft.com/sharepoint/v3/contenttype/forms">
-  <Display>DocumentLibraryForm</Display>
-  <Edit>AssetEditForm</Edit>
-  <New>DocumentLibraryForm</New>
-</FormTemplates>
+<file path=customXml/itemProps1.xml><?xml version="1.0" encoding="utf-8"?>
+<ds:datastoreItem xmlns:ds="http://schemas.openxmlformats.org/officeDocument/2006/customXml" ds:itemID="{BCC3733B-D3C8-4268-BA19-99FA97C1565D}">
+  <ds:schemaRefs>
+    <ds:schemaRef ds:uri="http://schemas.microsoft.com/office/2006/metadata/properties"/>
+    <ds:schemaRef ds:uri="http://schemas.microsoft.com/office/infopath/2007/PartnerControls"/>
+    <ds:schemaRef ds:uri="6d93d202-47fc-4405-873a-cab67cc5f1b2"/>
+    <ds:schemaRef ds:uri="64acb2c5-0a2b-4bda-bd34-58e36cbb80d2"/>
+  </ds:schemaRefs>
+</ds:datastoreItem>
 </file>
 
-<file path=customXml/item3.xml><?xml version="1.0" encoding="utf-8"?>
-<p:properties xmlns:p="http://schemas.microsoft.com/office/2006/metadata/properties" xmlns:xsi="http://www.w3.org/2001/XMLSchema-instance" xmlns:pc="http://schemas.microsoft.com/office/infopath/2007/PartnerControls">
-  <documentManagement>
-    <AcquiredFrom xmlns="6d93d202-47fc-4405-873a-cab67cc5f1b2" xsi:nil="true"/>
-    <IsSearchable xmlns="6d93d202-47fc-4405-873a-cab67cc5f1b2">true</IsSearchable>
-    <EditorialStatus xmlns="6d93d202-47fc-4405-873a-cab67cc5f1b2">Complete</EditorialStatus>
-    <OriginAsset xmlns="6d93d202-47fc-4405-873a-cab67cc5f1b2" xsi:nil="true"/>
-    <ThumbnailAssetId xmlns="6d93d202-47fc-4405-873a-cab67cc5f1b2" xsi:nil="true"/>
-    <TrustLevel xmlns="6d93d202-47fc-4405-873a-cab67cc5f1b2">3 Community New</TrustLevel>
-    <MarketSpecific xmlns="6d93d202-47fc-4405-873a-cab67cc5f1b2">true</MarketSpecific>
-    <TPNamespace xmlns="6d93d202-47fc-4405-873a-cab67cc5f1b2" xsi:nil="true"/>
-    <DirectSourceMarket xmlns="6d93d202-47fc-4405-873a-cab67cc5f1b2">english</DirectSourceMarket>
-    <MachineTranslated xmlns="6d93d202-47fc-4405-873a-cab67cc5f1b2">false</MachineTranslated>
-    <PlannedPubDate xmlns="6d93d202-47fc-4405-873a-cab67cc5f1b2" xsi:nil="true"/>
-    <SubmitterId xmlns="6d93d202-47fc-4405-873a-cab67cc5f1b2">9c60ae39-ee33-43c2-b863-454968d0f2cc</SubmitterId>
-    <Downloads xmlns="6d93d202-47fc-4405-873a-cab67cc5f1b2">0</Downloads>
-    <OriginalSourceMarket xmlns="6d93d202-47fc-4405-873a-cab67cc5f1b2">english</OriginalSourceMarket>
-    <PublishTargets xmlns="6d93d202-47fc-4405-873a-cab67cc5f1b2">OfficeOnline</PublishTargets>
-    <ArtSampleDocs xmlns="6d93d202-47fc-4405-873a-cab67cc5f1b2" xsi:nil="true"/>
-    <ApprovalLog xmlns="6d93d202-47fc-4405-873a-cab67cc5f1b2" xsi:nil="true"/>
-    <ApprovalStatus xmlns="6d93d202-47fc-4405-873a-cab67cc5f1b2">InProgress</ApprovalStatus>
-    <TPComponent xmlns="6d93d202-47fc-4405-873a-cab67cc5f1b2">PPTFiles</TPComponent>
-    <EditorialTags xmlns="6d93d202-47fc-4405-873a-cab67cc5f1b2" xsi:nil="true"/>
-    <TPExecutable xmlns="6d93d202-47fc-4405-873a-cab67cc5f1b2" xsi:nil="true"/>
-    <LastHandOff xmlns="6d93d202-47fc-4405-873a-cab67cc5f1b2" xsi:nil="true"/>
-    <BusinessGroup xmlns="6d93d202-47fc-4405-873a-cab67cc5f1b2" xsi:nil="true"/>
-    <TPAppVersion xmlns="6d93d202-47fc-4405-873a-cab67cc5f1b2">12</TPAppVersion>
-    <VoteCount xmlns="6d93d202-47fc-4405-873a-cab67cc5f1b2" xsi:nil="true"/>
-    <APAuthor xmlns="6d93d202-47fc-4405-873a-cab67cc5f1b2">
-      <UserInfo>
-        <DisplayName>_o14migrate</DisplayName>
-        <AccountId>266</AccountId>
-        <AccountType/>
-      </UserInfo>
-    </APAuthor>
-    <TPCommandLine xmlns="6d93d202-47fc-4405-873a-cab67cc5f1b2">{PP} /n {FilePath}</TPCommandLine>
-    <UACurrentWords xmlns="6d93d202-47fc-4405-873a-cab67cc5f1b2" xsi:nil="true"/>
-    <AssetId xmlns="6d93d202-47fc-4405-873a-cab67cc5f1b2">TP030007338</AssetId>
-    <Manager xmlns="6d93d202-47fc-4405-873a-cab67cc5f1b2" xsi:nil="true"/>
-    <NumericId xmlns="6d93d202-47fc-4405-873a-cab67cc5f1b2">-1</NumericId>
-    <Component xmlns="64acb2c5-0a2b-4bda-bd34-58e36cbb80d2" xsi:nil="true"/>
-    <HandoffToMSDN xmlns="6d93d202-47fc-4405-873a-cab67cc5f1b2" xsi:nil="true"/>
-    <Markets xmlns="6d93d202-47fc-4405-873a-cab67cc5f1b2">
-      <Value>2</Value>
-    </Markets>
-    <UALocComments xmlns="6d93d202-47fc-4405-873a-cab67cc5f1b2" xsi:nil="true"/>
-    <UALocRecommendation xmlns="6d93d202-47fc-4405-873a-cab67cc5f1b2">Localize</UALocRecommendation>
-    <AssetStart xmlns="6d93d202-47fc-4405-873a-cab67cc5f1b2">2010-04-16T14:31:10+00:00</AssetStart>
-    <CrawlForDependencies xmlns="6d93d202-47fc-4405-873a-cab67cc5f1b2">false</CrawlForDependencies>
-    <LastModifiedDateTime xmlns="6d93d202-47fc-4405-873a-cab67cc5f1b2" xsi:nil="true"/>
-    <LastPublishResultLookup xmlns="6d93d202-47fc-4405-873a-cab67cc5f1b2" xsi:nil="true"/>
-    <PublishStatusLookup xmlns="6d93d202-47fc-4405-873a-cab67cc5f1b2">
-      <Value>328776</Value>
-      <Value>502242</Value>
-    </PublishStatusLookup>
-    <AverageRating xmlns="6d93d202-47fc-4405-873a-cab67cc5f1b2" xsi:nil="true"/>
-    <CSXUpdate xmlns="6d93d202-47fc-4405-873a-cab67cc5f1b2">false</CSXUpdate>
-    <UAProjectedTotalWords xmlns="6d93d202-47fc-4405-873a-cab67cc5f1b2" xsi:nil="true"/>
-    <AssetExpire xmlns="6d93d202-47fc-4405-873a-cab67cc5f1b2">2100-01-01T00:00:00+00:00</AssetExpire>
-    <AssetType xmlns="6d93d202-47fc-4405-873a-cab67cc5f1b2">TP</AssetType>
-    <IntlLangReviewDate xmlns="6d93d202-47fc-4405-873a-cab67cc5f1b2" xsi:nil="true"/>
-    <TPFriendlyName xmlns="6d93d202-47fc-4405-873a-cab67cc5f1b2">Thème foot - Stade</TPFriendlyName>
-    <IntlLangReview xmlns="6d93d202-47fc-4405-873a-cab67cc5f1b2" xsi:nil="true"/>
-    <OOCacheId xmlns="6d93d202-47fc-4405-873a-cab67cc5f1b2" xsi:nil="true"/>
-    <PolicheckWords xmlns="6d93d202-47fc-4405-873a-cab67cc5f1b2" xsi:nil="true"/>
-    <TemplateStatus xmlns="6d93d202-47fc-4405-873a-cab67cc5f1b2">Complete</TemplateStatus>
-    <CSXSubmissionMarket xmlns="6d93d202-47fc-4405-873a-cab67cc5f1b2" xsi:nil="true"/>
-    <FriendlyTitle xmlns="6d93d202-47fc-4405-873a-cab67cc5f1b2" xsi:nil="true"/>
-    <TPLaunchHelpLinkType xmlns="6d93d202-47fc-4405-873a-cab67cc5f1b2" xsi:nil="true"/>
-    <Providers xmlns="6d93d202-47fc-4405-873a-cab67cc5f1b2" xsi:nil="true"/>
-    <SourceTitle xmlns="6d93d202-47fc-4405-873a-cab67cc5f1b2">Thème foot - Stade</SourceTitle>
-    <TemplateTemplateType xmlns="6d93d202-47fc-4405-873a-cab67cc5f1b2">PowerPoint 12 Default</TemplateTemplateType>
-    <TimesCloned xmlns="6d93d202-47fc-4405-873a-cab67cc5f1b2" xsi:nil="true"/>
-    <ClipArtFilename xmlns="6d93d202-47fc-4405-873a-cab67cc5f1b2" xsi:nil="true"/>
-    <APDescription xmlns="6d93d202-47fc-4405-873a-cab67cc5f1b2" xsi:nil="true"/>
-    <TPApplication xmlns="6d93d202-47fc-4405-873a-cab67cc5f1b2">PowerPoint</TPApplication>
-    <CSXHash xmlns="6d93d202-47fc-4405-873a-cab67cc5f1b2">vG7ZKCtvohoLZ8n/FgAYq13p/5c=</CSXHash>
-    <PrimaryImageGen xmlns="6d93d202-47fc-4405-873a-cab67cc5f1b2">true</PrimaryImageGen>
-    <ContentItem xmlns="6d93d202-47fc-4405-873a-cab67cc5f1b2" xsi:nil="true"/>
-    <IsDeleted xmlns="6d93d202-47fc-4405-873a-cab67cc5f1b2">false</IsDeleted>
-    <ShowIn xmlns="6d93d202-47fc-4405-873a-cab67cc5f1b2">Show everywhere</ShowIn>
-    <BugNumber xmlns="6d93d202-47fc-4405-873a-cab67cc5f1b2" xsi:nil="true"/>
-    <LegacyData xmlns="6d93d202-47fc-4405-873a-cab67cc5f1b2">ListingID:;Manager:;BuildStatus:Publish Passed;MockupPath:</LegacyData>
-    <TPLaunchHelpLink xmlns="6d93d202-47fc-4405-873a-cab67cc5f1b2" xsi:nil="true"/>
-    <Milestone xmlns="6d93d202-47fc-4405-873a-cab67cc5f1b2" xsi:nil="true"/>
-    <UANotes xmlns="6d93d202-47fc-4405-873a-cab67cc5f1b2" xsi:nil="true"/>
-    <Description0 xmlns="64acb2c5-0a2b-4bda-bd34-58e36cbb80d2" xsi:nil="true"/>
-    <IntlLangReviewer xmlns="6d93d202-47fc-4405-873a-cab67cc5f1b2" xsi:nil="true"/>
-    <IntlLocPriority xmlns="6d93d202-47fc-4405-873a-cab67cc5f1b2" xsi:nil="true"/>
-    <OpenTemplate xmlns="6d93d202-47fc-4405-873a-cab67cc5f1b2">true</OpenTemplate>
-    <Provider xmlns="6d93d202-47fc-4405-873a-cab67cc5f1b2" xsi:nil="true"/>
-    <CSXSubmissionDate xmlns="6d93d202-47fc-4405-873a-cab67cc5f1b2">2009-10-10T07:00:00+00:00</CSXSubmissionDate>
-    <TPClientViewer xmlns="6d93d202-47fc-4405-873a-cab67cc5f1b2" xsi:nil="true"/>
-    <DSATActionTaken xmlns="6d93d202-47fc-4405-873a-cab67cc5f1b2" xsi:nil="true"/>
-    <APEditor xmlns="6d93d202-47fc-4405-873a-cab67cc5f1b2">
-      <UserInfo>
-        <DisplayName>_o14migrate</DisplayName>
-        <AccountId>266</AccountId>
-        <AccountType/>
-      </UserInfo>
-    </APEditor>
-    <TPInstallLocation xmlns="6d93d202-47fc-4405-873a-cab67cc5f1b2">{My Templates}</TPInstallLocation>
-    <OutputCachingOn xmlns="6d93d202-47fc-4405-873a-cab67cc5f1b2">false</OutputCachingOn>
-    <ParentAssetId xmlns="6d93d202-47fc-4405-873a-cab67cc5f1b2" xsi:nil="true"/>
-    <LocManualTestRequired xmlns="6d93d202-47fc-4405-873a-cab67cc5f1b2">false</LocManualTestRequired>
-    <LocalizationTagsTaxHTField0 xmlns="6d93d202-47fc-4405-873a-cab67cc5f1b2">
-      <Terms xmlns="http://schemas.microsoft.com/office/infopath/2007/PartnerControls"/>
-    </LocalizationTagsTaxHTField0>
-    <CampaignTagsTaxHTField0 xmlns="6d93d202-47fc-4405-873a-cab67cc5f1b2">
-      <Terms xmlns="http://schemas.microsoft.com/office/infopath/2007/PartnerControls"/>
-    </CampaignTagsTaxHTField0>
-    <LocLastLocAttemptVersionLookup xmlns="6d93d202-47fc-4405-873a-cab67cc5f1b2">169854</LocLastLocAttemptVersionLookup>
-    <InternalTagsTaxHTField0 xmlns="6d93d202-47fc-4405-873a-cab67cc5f1b2">
-      <Terms xmlns="http://schemas.microsoft.com/office/infopath/2007/PartnerControls"/>
-    </InternalTagsTaxHTField0>
-    <LocRecommendedHandoff xmlns="6d93d202-47fc-4405-873a-cab67cc5f1b2" xsi:nil="true"/>
-    <BlockPublish xmlns="6d93d202-47fc-4405-873a-cab67cc5f1b2">false</BlockPublish>
-    <LocComments xmlns="6d93d202-47fc-4405-873a-cab67cc5f1b2" xsi:nil="true"/>
-    <TaxCatchAll xmlns="6d93d202-47fc-4405-873a-cab67cc5f1b2"/>
-    <OriginalRelease xmlns="6d93d202-47fc-4405-873a-cab67cc5f1b2">14</OriginalRelease>
-    <RecommendationsModifier xmlns="6d93d202-47fc-4405-873a-cab67cc5f1b2" xsi:nil="true"/>
-    <ScenarioTagsTaxHTField0 xmlns="6d93d202-47fc-4405-873a-cab67cc5f1b2">
-      <Terms xmlns="http://schemas.microsoft.com/office/infopath/2007/PartnerControls"/>
-    </ScenarioTagsTaxHTField0>
-    <FeatureTagsTaxHTField0 xmlns="6d93d202-47fc-4405-873a-cab67cc5f1b2">
-      <Terms xmlns="http://schemas.microsoft.com/office/infopath/2007/PartnerControls"/>
-    </FeatureTagsTaxHTField0>
-    <LocMarketGroupTiers2 xmlns="6d93d202-47fc-4405-873a-cab67cc5f1b2" xsi:nil="true"/>
-  </documentManagement>
-</p:properties>
+<file path=customXml/itemProps2.xml><?xml version="1.0" encoding="utf-8"?>
+<ds:datastoreItem xmlns:ds="http://schemas.openxmlformats.org/officeDocument/2006/customXml" ds:itemID="{64A340D0-B28B-4586-97B5-1B66B44AC228}">
+  <ds:schemaRefs>
+    <ds:schemaRef ds:uri="http://schemas.microsoft.com/sharepoint/v3/contenttype/forms"/>
+  </ds:schemaRefs>
+</ds:datastoreItem>
 </file>
 
-<file path=customXml/itemProps1.xml><?xml version="1.0" encoding="utf-8"?>
+<file path=customXml/itemProps3.xml><?xml version="1.0" encoding="utf-8"?>
 <ds:datastoreItem xmlns:ds="http://schemas.openxmlformats.org/officeDocument/2006/customXml" ds:itemID="{C41B4AEE-4EDF-4F84-ADFA-5403CCA7E505}">
   <ds:schemaRefs>
     <ds:schemaRef ds:uri="http://schemas.microsoft.com/office/2006/metadata/contentType"/>
@@ -5329,23 +6180,4 @@
     <ds:schemaRef ds:uri="http://schemas.microsoft.com/internal/obd"/>
   </ds:schemaRefs>
 </ds:datastoreItem>
-</file>
-
-<file path=customXml/itemProps2.xml><?xml version="1.0" encoding="utf-8"?>
-<ds:datastoreItem xmlns:ds="http://schemas.openxmlformats.org/officeDocument/2006/customXml" ds:itemID="{64A340D0-B28B-4586-97B5-1B66B44AC228}">
-  <ds:schemaRefs>
-    <ds:schemaRef ds:uri="http://schemas.microsoft.com/sharepoint/v3/contenttype/forms"/>
-  </ds:schemaRefs>
-</ds:datastoreItem>
-</file>
-
-<file path=customXml/itemProps3.xml><?xml version="1.0" encoding="utf-8"?>
-<ds:datastoreItem xmlns:ds="http://schemas.openxmlformats.org/officeDocument/2006/customXml" ds:itemID="{BCC3733B-D3C8-4268-BA19-99FA97C1565D}">
-  <ds:schemaRefs>
-    <ds:schemaRef ds:uri="http://schemas.microsoft.com/office/2006/metadata/properties"/>
-    <ds:schemaRef ds:uri="http://schemas.microsoft.com/office/infopath/2007/PartnerControls"/>
-    <ds:schemaRef ds:uri="6d93d202-47fc-4405-873a-cab67cc5f1b2"/>
-    <ds:schemaRef ds:uri="64acb2c5-0a2b-4bda-bd34-58e36cbb80d2"/>
-  </ds:schemaRefs>
-</ds:datastoreItem>
 </file>
</xml_diff>